<commit_message>
Added pictures for integration
</commit_message>
<xml_diff>
--- a/Physics 101.pptx
+++ b/Physics 101.pptx
@@ -237,7 +237,7 @@
           <a:p>
             <a:fld id="{B0431BEA-5E23-40C3-9E68-C0C575738BB3}" type="datetimeFigureOut">
               <a:rPr lang="en-US" smtClean="0"/>
-              <a:t>6/27/2018</a:t>
+              <a:t>7/5/2018</a:t>
             </a:fld>
             <a:endParaRPr lang="en-US"/>
           </a:p>
@@ -780,11 +780,7 @@
           <a:p>
             <a:r>
               <a:rPr lang="en-US" dirty="0" smtClean="0"/>
-              <a:t>The core physics update loop is broken up into 4 main </a:t>
-            </a:r>
-            <a:r>
-              <a:rPr lang="en-US" dirty="0" smtClean="0"/>
-              <a:t>concepts.</a:t>
+              <a:t>The core physics update loop is broken up into 4 main concepts.</a:t>
             </a:r>
           </a:p>
           <a:p>
@@ -868,8 +864,8 @@
         </p:nvSpPr>
         <p:spPr/>
       </p:sp>
-      <mc:AlternateContent xmlns:mc="http://schemas.openxmlformats.org/markup-compatibility/2006">
-        <mc:Choice xmlns:a14="http://schemas.microsoft.com/office/drawing/2010/main" Requires="a14">
+      <mc:AlternateContent xmlns:mc="http://schemas.openxmlformats.org/markup-compatibility/2006" xmlns:a14="http://schemas.microsoft.com/office/drawing/2010/main">
+        <mc:Choice Requires="a14">
           <p:sp>
             <p:nvSpPr>
               <p:cNvPr id="3" name="Notes Placeholder 2"/>
@@ -952,7 +948,7 @@
             </p:txBody>
           </p:sp>
         </mc:Choice>
-        <mc:Fallback>
+        <mc:Fallback xmlns="">
           <p:sp>
             <p:nvSpPr>
               <p:cNvPr id="3" name="Notes Placeholder 2"/>
@@ -1132,8 +1128,26 @@
             </a:r>
             <a:r>
               <a:rPr lang="en-US" b="0" baseline="0" dirty="0" smtClean="0"/>
-              <a:t>so never use it! The current industry standard (AAA games even) is to use semi-implicit Euler.</a:t>
-            </a:r>
+              <a:t>so never use it! The current industry standard (AAA games even) is to use semi-implicit Euler</a:t>
+            </a:r>
+            <a:r>
+              <a:rPr lang="en-US" b="0" baseline="0" dirty="0" smtClean="0"/>
+              <a:t>.</a:t>
+            </a:r>
+          </a:p>
+          <a:p>
+            <a:endParaRPr lang="en-US" b="0" baseline="0" dirty="0" smtClean="0"/>
+          </a:p>
+          <a:p>
+            <a:r>
+              <a:rPr lang="en-US" b="0" baseline="0" dirty="0" smtClean="0"/>
+              <a:t>The above pictures show a very simple n-body force simulation (planet gravity). Notice that in the explicit Euler simulation the orbiting body gets further away until it’ll eventually fly off. However, notice the semi-implicit Euler maintains a perfect </a:t>
+            </a:r>
+            <a:r>
+              <a:rPr lang="en-US" b="0" baseline="0" smtClean="0"/>
+              <a:t>circular orbit.</a:t>
+            </a:r>
+            <a:endParaRPr lang="en-US" b="0" baseline="0" dirty="0" smtClean="0"/>
           </a:p>
           <a:p>
             <a:endParaRPr lang="en-US" baseline="0" dirty="0" smtClean="0"/>
@@ -1141,15 +1155,7 @@
           <a:p>
             <a:r>
               <a:rPr lang="en-US" baseline="0" dirty="0" smtClean="0"/>
-              <a:t>As a note, you </a:t>
-            </a:r>
-            <a:r>
-              <a:rPr lang="en-US" baseline="0" dirty="0" smtClean="0"/>
-              <a:t>‘need’ </a:t>
-            </a:r>
-            <a:r>
-              <a:rPr lang="en-US" baseline="0" dirty="0" smtClean="0"/>
-              <a:t>better integration when forces are dependent on position, like spring systems.</a:t>
+              <a:t>As a note, you ‘need’ better integration when forces are dependent on position, like spring systems.</a:t>
             </a:r>
             <a:endParaRPr lang="en-US" dirty="0"/>
           </a:p>
@@ -1345,56 +1351,20 @@
             </a:r>
             <a:r>
               <a:rPr lang="en-US" dirty="0" smtClean="0"/>
-              <a:t>is </a:t>
-            </a:r>
-            <a:r>
-              <a:rPr lang="en-US" dirty="0" smtClean="0"/>
-              <a:t>a coarse</a:t>
+              <a:t>is a coarse</a:t>
             </a:r>
             <a:r>
               <a:rPr lang="en-US" baseline="0" dirty="0" smtClean="0"/>
-              <a:t> high-level approximation of collision detection. The idea is that no optimization is better than not doing something. We’ll see in a bit, but </a:t>
-            </a:r>
+              <a:t> high-level approximation of collision detection. The idea is that no optimization is better than not doing something. We’ll see in a bit, but narrow-phase is a lot more expensive than broad-phase so we want to limit what can get there.</a:t>
+            </a:r>
+          </a:p>
+          <a:p>
+            <a:endParaRPr lang="en-US" baseline="0" dirty="0" smtClean="0"/>
+          </a:p>
+          <a:p>
             <a:r>
               <a:rPr lang="en-US" baseline="0" dirty="0" smtClean="0"/>
-              <a:t>narrow-phase is </a:t>
-            </a:r>
-            <a:r>
-              <a:rPr lang="en-US" baseline="0" dirty="0" smtClean="0"/>
-              <a:t>a lot more expensive than </a:t>
-            </a:r>
-            <a:r>
-              <a:rPr lang="en-US" baseline="0" dirty="0" smtClean="0"/>
-              <a:t>broad-phase so </a:t>
-            </a:r>
-            <a:r>
-              <a:rPr lang="en-US" baseline="0" dirty="0" smtClean="0"/>
-              <a:t>we want to limit what can get there.</a:t>
-            </a:r>
-          </a:p>
-          <a:p>
-            <a:endParaRPr lang="en-US" baseline="0" dirty="0" smtClean="0"/>
-          </a:p>
-          <a:p>
-            <a:r>
-              <a:rPr lang="en-US" baseline="0" dirty="0" smtClean="0"/>
-              <a:t>Typically, </a:t>
-            </a:r>
-            <a:r>
-              <a:rPr lang="en-US" baseline="0" dirty="0" smtClean="0"/>
-              <a:t>broad-phase will </a:t>
-            </a:r>
-            <a:r>
-              <a:rPr lang="en-US" baseline="0" dirty="0" smtClean="0"/>
-              <a:t>take all of the objects in your scene and return possible pairs that could collide. </a:t>
-            </a:r>
-            <a:r>
-              <a:rPr lang="en-US" baseline="0" dirty="0" smtClean="0"/>
-              <a:t>To be fast, broad-phase does approximations that will efficiently reject possible pairs but will return false </a:t>
-            </a:r>
-            <a:r>
-              <a:rPr lang="en-US" baseline="0" dirty="0" smtClean="0"/>
-              <a:t>positives. A good example is wrapping each object in an </a:t>
+              <a:t>Typically, broad-phase will take all of the objects in your scene and return possible pairs that could collide. To be fast, broad-phase does approximations that will efficiently reject possible pairs but will return false positives. A good example is wrapping each object in an </a:t>
             </a:r>
             <a:r>
               <a:rPr lang="en-US" baseline="0" dirty="0" err="1" smtClean="0"/>
@@ -1402,15 +1372,7 @@
             </a:r>
             <a:r>
               <a:rPr lang="en-US" baseline="0" dirty="0" smtClean="0"/>
-              <a:t> and checking collision with </a:t>
-            </a:r>
-            <a:r>
-              <a:rPr lang="en-US" baseline="0" dirty="0" smtClean="0"/>
-              <a:t>that (pictured above). </a:t>
-            </a:r>
-            <a:r>
-              <a:rPr lang="en-US" baseline="0" dirty="0" smtClean="0"/>
-              <a:t>An </a:t>
+              <a:t> and checking collision with that (pictured above). An </a:t>
             </a:r>
             <a:r>
               <a:rPr lang="en-US" baseline="0" dirty="0" err="1" smtClean="0"/>
@@ -1418,11 +1380,7 @@
             </a:r>
             <a:r>
               <a:rPr lang="en-US" baseline="0" dirty="0" smtClean="0"/>
-              <a:t> check is very cheap but </a:t>
-            </a:r>
-            <a:r>
-              <a:rPr lang="en-US" baseline="0" dirty="0" smtClean="0"/>
-              <a:t>isn’t accurate to most shapes.</a:t>
+              <a:t> check is very cheap but isn’t accurate to most shapes.</a:t>
             </a:r>
           </a:p>
           <a:p>
@@ -1433,7 +1391,6 @@
               <a:rPr lang="en-US" baseline="0" dirty="0" smtClean="0"/>
               <a:t>Note: broad-phase can return false positives but can never produce false negatives (e.g. it can’t miss anything).</a:t>
             </a:r>
-            <a:endParaRPr lang="en-US" baseline="0" dirty="0" smtClean="0"/>
           </a:p>
         </p:txBody>
       </p:sp>
@@ -1705,7 +1662,6 @@
               <a:rPr lang="en-US" baseline="0" dirty="0" smtClean="0"/>
               <a:t>, and maybe triangles. If you want to get more advanced at some point I’d recommend looking into either SAT or GJK.</a:t>
             </a:r>
-            <a:endParaRPr lang="en-US" baseline="0" dirty="0" smtClean="0"/>
           </a:p>
         </p:txBody>
       </p:sp>
@@ -2045,23 +2001,7 @@
             </a:pPr>
             <a:r>
               <a:rPr lang="en-US" baseline="0" dirty="0" smtClean="0"/>
-              <a:t>SAT </a:t>
-            </a:r>
-            <a:r>
-              <a:rPr lang="en-US" baseline="0" dirty="0" smtClean="0"/>
-              <a:t>(Separating Axis Theorem) is </a:t>
-            </a:r>
-            <a:r>
-              <a:rPr lang="en-US" baseline="0" dirty="0" smtClean="0"/>
-              <a:t>significantly easier to understand and fairly easy to implement but doesn’t easily work with non-polygons. </a:t>
-            </a:r>
-            <a:r>
-              <a:rPr lang="en-US" baseline="0" dirty="0" smtClean="0"/>
-              <a:t>GJK works </a:t>
-            </a:r>
-            <a:r>
-              <a:rPr lang="en-US" baseline="0" dirty="0" smtClean="0"/>
-              <a:t>with everything but is much harder to understand (not to implement). Additionally GJK won’t help when it comes to generating the contact manifold, a separate algorithm known as EPA is required.</a:t>
+              <a:t>SAT (Separating Axis Theorem) is significantly easier to understand and fairly easy to implement but doesn’t easily work with non-polygons. GJK works with everything but is much harder to understand (not to implement). Additionally GJK won’t help when it comes to generating the contact manifold, a separate algorithm known as EPA is required.</a:t>
             </a:r>
           </a:p>
           <a:p>
@@ -2395,7 +2335,6 @@
               <a:rPr lang="en-US" baseline="0" dirty="0" smtClean="0"/>
               <a:t>One important thing to realize about resolution is that it is by far the most expensive phase in the physics engine so it’s very important to prevent as many things as possible from getting here.</a:t>
             </a:r>
-            <a:endParaRPr lang="en-US" baseline="0" dirty="0" smtClean="0"/>
           </a:p>
         </p:txBody>
       </p:sp>
@@ -2485,11 +2424,7 @@
             </a:r>
             <a:r>
               <a:rPr lang="en-US" baseline="0" dirty="0" smtClean="0"/>
-              <a:t> commonly implemented by applying impulses (an instantaneous force) to objects to produce realistic looking collision behavior. There’s two common approaches to this nowadays: Impulses and Constraints. These </a:t>
-            </a:r>
-            <a:r>
-              <a:rPr lang="en-US" baseline="0" dirty="0" smtClean="0"/>
-              <a:t>approaches actually aren’t really that different when working only with contacts, but conceptually they’re quite different. There’s a lot of bad information on both of these topics floating around on the internet so I recommend being careful.</a:t>
+              <a:t> commonly implemented by applying impulses (an instantaneous force) to objects to produce realistic looking collision behavior. There’s two common approaches to this nowadays: Impulses and Constraints. These approaches actually aren’t really that different when working only with contacts, but conceptually they’re quite different. There’s a lot of bad information on both of these topics floating around on the internet so I recommend being careful.</a:t>
             </a:r>
           </a:p>
           <a:p>
@@ -4459,8 +4394,8 @@
         </p:nvSpPr>
         <p:spPr/>
       </p:sp>
-      <mc:AlternateContent xmlns:mc="http://schemas.openxmlformats.org/markup-compatibility/2006">
-        <mc:Choice xmlns:a14="http://schemas.microsoft.com/office/drawing/2010/main" Requires="a14">
+      <mc:AlternateContent xmlns:mc="http://schemas.openxmlformats.org/markup-compatibility/2006" xmlns:a14="http://schemas.microsoft.com/office/drawing/2010/main">
+        <mc:Choice Requires="a14">
           <p:sp>
             <p:nvSpPr>
               <p:cNvPr id="3" name="Notes Placeholder 2"/>
@@ -4553,7 +4488,6 @@
                   <a:rPr lang="en-US" baseline="0" dirty="0" smtClean="0"/>
                   <a:t>These material properties are commonly grouped together in a material so that data can be shared both saving memory and making it easier to change lots of objects at once.</a:t>
                 </a:r>
-                <a:endParaRPr lang="en-US" baseline="0" dirty="0" smtClean="0"/>
               </a:p>
               <a:p>
                 <a:r>
@@ -4565,7 +4499,7 @@
             </p:txBody>
           </p:sp>
         </mc:Choice>
-        <mc:Fallback>
+        <mc:Fallback xmlns="">
           <p:sp>
             <p:nvSpPr>
               <p:cNvPr id="3" name="Notes Placeholder 2"/>
@@ -5341,7 +5275,7 @@
           <a:p>
             <a:fld id="{2B55C853-9142-445C-BC01-2E21383A87DA}" type="datetimeFigureOut">
               <a:rPr lang="en-US" smtClean="0"/>
-              <a:t>6/27/2018</a:t>
+              <a:t>7/5/2018</a:t>
             </a:fld>
             <a:endParaRPr lang="en-US"/>
           </a:p>
@@ -5511,7 +5445,7 @@
           <a:p>
             <a:fld id="{2B55C853-9142-445C-BC01-2E21383A87DA}" type="datetimeFigureOut">
               <a:rPr lang="en-US" smtClean="0"/>
-              <a:t>6/27/2018</a:t>
+              <a:t>7/5/2018</a:t>
             </a:fld>
             <a:endParaRPr lang="en-US"/>
           </a:p>
@@ -5691,7 +5625,7 @@
           <a:p>
             <a:fld id="{2B55C853-9142-445C-BC01-2E21383A87DA}" type="datetimeFigureOut">
               <a:rPr lang="en-US" smtClean="0"/>
-              <a:t>6/27/2018</a:t>
+              <a:t>7/5/2018</a:t>
             </a:fld>
             <a:endParaRPr lang="en-US"/>
           </a:p>
@@ -5861,7 +5795,7 @@
           <a:p>
             <a:fld id="{2B55C853-9142-445C-BC01-2E21383A87DA}" type="datetimeFigureOut">
               <a:rPr lang="en-US" smtClean="0"/>
-              <a:t>6/27/2018</a:t>
+              <a:t>7/5/2018</a:t>
             </a:fld>
             <a:endParaRPr lang="en-US"/>
           </a:p>
@@ -6107,7 +6041,7 @@
           <a:p>
             <a:fld id="{2B55C853-9142-445C-BC01-2E21383A87DA}" type="datetimeFigureOut">
               <a:rPr lang="en-US" smtClean="0"/>
-              <a:t>6/27/2018</a:t>
+              <a:t>7/5/2018</a:t>
             </a:fld>
             <a:endParaRPr lang="en-US"/>
           </a:p>
@@ -6339,7 +6273,7 @@
           <a:p>
             <a:fld id="{2B55C853-9142-445C-BC01-2E21383A87DA}" type="datetimeFigureOut">
               <a:rPr lang="en-US" smtClean="0"/>
-              <a:t>6/27/2018</a:t>
+              <a:t>7/5/2018</a:t>
             </a:fld>
             <a:endParaRPr lang="en-US"/>
           </a:p>
@@ -6706,7 +6640,7 @@
           <a:p>
             <a:fld id="{2B55C853-9142-445C-BC01-2E21383A87DA}" type="datetimeFigureOut">
               <a:rPr lang="en-US" smtClean="0"/>
-              <a:t>6/27/2018</a:t>
+              <a:t>7/5/2018</a:t>
             </a:fld>
             <a:endParaRPr lang="en-US"/>
           </a:p>
@@ -6824,7 +6758,7 @@
           <a:p>
             <a:fld id="{2B55C853-9142-445C-BC01-2E21383A87DA}" type="datetimeFigureOut">
               <a:rPr lang="en-US" smtClean="0"/>
-              <a:t>6/27/2018</a:t>
+              <a:t>7/5/2018</a:t>
             </a:fld>
             <a:endParaRPr lang="en-US"/>
           </a:p>
@@ -6919,7 +6853,7 @@
           <a:p>
             <a:fld id="{2B55C853-9142-445C-BC01-2E21383A87DA}" type="datetimeFigureOut">
               <a:rPr lang="en-US" smtClean="0"/>
-              <a:t>6/27/2018</a:t>
+              <a:t>7/5/2018</a:t>
             </a:fld>
             <a:endParaRPr lang="en-US"/>
           </a:p>
@@ -7196,7 +7130,7 @@
           <a:p>
             <a:fld id="{2B55C853-9142-445C-BC01-2E21383A87DA}" type="datetimeFigureOut">
               <a:rPr lang="en-US" smtClean="0"/>
-              <a:t>6/27/2018</a:t>
+              <a:t>7/5/2018</a:t>
             </a:fld>
             <a:endParaRPr lang="en-US"/>
           </a:p>
@@ -7449,7 +7383,7 @@
           <a:p>
             <a:fld id="{2B55C853-9142-445C-BC01-2E21383A87DA}" type="datetimeFigureOut">
               <a:rPr lang="en-US" smtClean="0"/>
-              <a:t>6/27/2018</a:t>
+              <a:t>7/5/2018</a:t>
             </a:fld>
             <a:endParaRPr lang="en-US"/>
           </a:p>
@@ -7662,7 +7596,7 @@
           <a:p>
             <a:fld id="{2B55C853-9142-445C-BC01-2E21383A87DA}" type="datetimeFigureOut">
               <a:rPr lang="en-US" smtClean="0"/>
-              <a:t>6/27/2018</a:t>
+              <a:t>7/5/2018</a:t>
             </a:fld>
             <a:endParaRPr lang="en-US"/>
           </a:p>
@@ -8204,19 +8138,7 @@
             </a:pPr>
             <a:r>
               <a:rPr lang="en-US" dirty="0" smtClean="0"/>
-              <a:t>Defines the c</a:t>
-            </a:r>
-            <a:r>
-              <a:rPr lang="en-US" dirty="0" smtClean="0"/>
-              <a:t>ore </a:t>
-            </a:r>
-            <a:r>
-              <a:rPr lang="en-US" dirty="0" smtClean="0"/>
-              <a:t>update </a:t>
-            </a:r>
-            <a:r>
-              <a:rPr lang="en-US" dirty="0" smtClean="0"/>
-              <a:t>loop</a:t>
+              <a:t>Defines the core update loop</a:t>
             </a:r>
           </a:p>
           <a:p>
@@ -8237,15 +8159,7 @@
             </a:pPr>
             <a:r>
               <a:rPr lang="en-US" dirty="0" smtClean="0"/>
-              <a:t>Additionally provides “query</a:t>
-            </a:r>
-            <a:r>
-              <a:rPr lang="en-US" dirty="0" smtClean="0"/>
-              <a:t>” </a:t>
-            </a:r>
-            <a:r>
-              <a:rPr lang="en-US" dirty="0" smtClean="0"/>
-              <a:t>functions (</a:t>
+              <a:t>Additionally provides “query” functions (</a:t>
             </a:r>
             <a:r>
               <a:rPr lang="en-US" dirty="0" err="1" smtClean="0"/>
@@ -8395,7 +8309,6 @@
               <a:rPr lang="en-US" dirty="0" smtClean="0"/>
               <a:t> easier and more robust!</a:t>
             </a:r>
-            <a:endParaRPr lang="en-US" dirty="0" smtClean="0"/>
           </a:p>
           <a:p>
             <a:pPr marL="0" indent="0">
@@ -8503,11 +8416,7 @@
             </a:pPr>
             <a:r>
               <a:rPr lang="en-US" dirty="0" smtClean="0"/>
-              <a:t>Collision Detection – Find </a:t>
-            </a:r>
-            <a:r>
-              <a:rPr lang="en-US" dirty="0" smtClean="0"/>
-              <a:t>what’s colliding and where</a:t>
+              <a:t>Collision Detection – Find what’s colliding and where</a:t>
             </a:r>
           </a:p>
           <a:p>
@@ -8516,15 +8425,7 @@
             </a:pPr>
             <a:r>
               <a:rPr lang="en-US" dirty="0" smtClean="0"/>
-              <a:t>Collision Resolution </a:t>
-            </a:r>
-            <a:r>
-              <a:rPr lang="en-US" dirty="0" smtClean="0"/>
-              <a:t>– </a:t>
-            </a:r>
-            <a:r>
-              <a:rPr lang="en-US" dirty="0" smtClean="0"/>
-              <a:t>Apply collision response</a:t>
+              <a:t>Collision Resolution – Apply collision response</a:t>
             </a:r>
           </a:p>
           <a:p>
@@ -8533,11 +8434,7 @@
             </a:pPr>
             <a:r>
               <a:rPr lang="en-US" dirty="0" smtClean="0"/>
-              <a:t>Publishing </a:t>
-            </a:r>
-            <a:r>
-              <a:rPr lang="en-US" dirty="0" smtClean="0"/>
-              <a:t>– Tell everyone what happened</a:t>
+              <a:t>Publishing – Tell everyone what happened</a:t>
             </a:r>
           </a:p>
         </p:txBody>
@@ -8624,7 +8521,6 @@
               <a:rPr lang="en-US" dirty="0" smtClean="0"/>
               <a:t>Two sub-steps:</a:t>
             </a:r>
-            <a:endParaRPr lang="en-US" dirty="0" smtClean="0"/>
           </a:p>
           <a:p>
             <a:pPr marL="457200" lvl="1" indent="0">
@@ -8692,7 +8588,6 @@
               <a:rPr lang="en-US" dirty="0" smtClean="0"/>
               <a:t>RK4</a:t>
             </a:r>
-            <a:endParaRPr lang="en-US" dirty="0" smtClean="0"/>
           </a:p>
           <a:p>
             <a:pPr lvl="1"/>
@@ -8773,7 +8668,12 @@
                 <p:ph idx="1"/>
               </p:nvPr>
             </p:nvSpPr>
-            <p:spPr/>
+            <p:spPr>
+              <a:xfrm>
+                <a:off x="1419811" y="1579657"/>
+                <a:ext cx="2873829" cy="1461861"/>
+              </a:xfrm>
+            </p:spPr>
             <p:txBody>
               <a:bodyPr/>
               <a:lstStyle/>
@@ -8914,168 +8814,6 @@
                     </m:r>
                   </m:oMath>
                 </a14:m>
-                <a:endParaRPr lang="en-US" dirty="0" smtClean="0"/>
-              </a:p>
-              <a:p>
-                <a:pPr marL="0" indent="0">
-                  <a:buNone/>
-                </a:pPr>
-                <a:r>
-                  <a:rPr lang="en-US" dirty="0" smtClean="0"/>
-                  <a:t>Semi-implicit Euler</a:t>
-                </a:r>
-              </a:p>
-              <a:p>
-                <a:pPr marL="914400" lvl="1" indent="-457200">
-                  <a:buFont typeface="+mj-lt"/>
-                  <a:buAutoNum type="arabicPeriod"/>
-                </a:pPr>
-                <a14:m>
-                  <m:oMath xmlns:m="http://schemas.openxmlformats.org/officeDocument/2006/math">
-                    <m:acc>
-                      <m:accPr>
-                        <m:chr m:val="⃗"/>
-                        <m:ctrlPr>
-                          <a:rPr lang="en-US" b="0" i="1" smtClean="0">
-                            <a:latin typeface="Cambria Math" panose="02040503050406030204" pitchFamily="18" charset="0"/>
-                          </a:rPr>
-                        </m:ctrlPr>
-                      </m:accPr>
-                      <m:e>
-                        <m:r>
-                          <a:rPr lang="en-US" b="0" i="1" smtClean="0">
-                            <a:latin typeface="Cambria Math" panose="02040503050406030204" pitchFamily="18" charset="0"/>
-                          </a:rPr>
-                          <m:t>𝑣</m:t>
-                        </m:r>
-                      </m:e>
-                    </m:acc>
-                    <m:r>
-                      <a:rPr lang="en-US" b="0" i="1" dirty="0" smtClean="0">
-                        <a:latin typeface="Cambria Math" panose="02040503050406030204" pitchFamily="18" charset="0"/>
-                      </a:rPr>
-                      <m:t>+=</m:t>
-                    </m:r>
-                    <m:acc>
-                      <m:accPr>
-                        <m:chr m:val="⃗"/>
-                        <m:ctrlPr>
-                          <a:rPr lang="en-US" b="0" i="1" dirty="0" smtClean="0">
-                            <a:latin typeface="Cambria Math" panose="02040503050406030204" pitchFamily="18" charset="0"/>
-                          </a:rPr>
-                        </m:ctrlPr>
-                      </m:accPr>
-                      <m:e>
-                        <m:r>
-                          <a:rPr lang="en-US" b="0" i="1" dirty="0" smtClean="0">
-                            <a:latin typeface="Cambria Math" panose="02040503050406030204" pitchFamily="18" charset="0"/>
-                          </a:rPr>
-                          <m:t>𝑎</m:t>
-                        </m:r>
-                      </m:e>
-                    </m:acc>
-                    <m:r>
-                      <m:rPr>
-                        <m:sty m:val="p"/>
-                      </m:rPr>
-                      <a:rPr lang="en-US" b="0" i="0" dirty="0" smtClean="0">
-                        <a:latin typeface="Cambria Math" panose="02040503050406030204" pitchFamily="18" charset="0"/>
-                      </a:rPr>
-                      <m:t>Δ</m:t>
-                    </m:r>
-                    <m:r>
-                      <a:rPr lang="en-US" b="0" i="1" dirty="0" smtClean="0">
-                        <a:latin typeface="Cambria Math" panose="02040503050406030204" pitchFamily="18" charset="0"/>
-                      </a:rPr>
-                      <m:t>𝑡</m:t>
-                    </m:r>
-                  </m:oMath>
-                </a14:m>
-                <a:endParaRPr lang="en-US" b="0" i="1" dirty="0" smtClean="0">
-                  <a:latin typeface="Cambria Math" panose="02040503050406030204" pitchFamily="18" charset="0"/>
-                </a:endParaRPr>
-              </a:p>
-              <a:p>
-                <a:pPr marL="914400" lvl="1" indent="-457200">
-                  <a:buFont typeface="+mj-lt"/>
-                  <a:buAutoNum type="arabicPeriod"/>
-                </a:pPr>
-                <a14:m>
-                  <m:oMath xmlns:m="http://schemas.openxmlformats.org/officeDocument/2006/math">
-                    <m:acc>
-                      <m:accPr>
-                        <m:chr m:val="⃗"/>
-                        <m:ctrlPr>
-                          <a:rPr lang="en-US" b="0" i="1" smtClean="0">
-                            <a:latin typeface="Cambria Math" panose="02040503050406030204" pitchFamily="18" charset="0"/>
-                          </a:rPr>
-                        </m:ctrlPr>
-                      </m:accPr>
-                      <m:e>
-                        <m:r>
-                          <a:rPr lang="en-US" b="0" i="1" smtClean="0">
-                            <a:latin typeface="Cambria Math" panose="02040503050406030204" pitchFamily="18" charset="0"/>
-                          </a:rPr>
-                          <m:t>𝑝</m:t>
-                        </m:r>
-                      </m:e>
-                    </m:acc>
-                    <m:r>
-                      <a:rPr lang="en-US" b="0" i="1" smtClean="0">
-                        <a:latin typeface="Cambria Math" panose="02040503050406030204" pitchFamily="18" charset="0"/>
-                      </a:rPr>
-                      <m:t>+=</m:t>
-                    </m:r>
-                    <m:acc>
-                      <m:accPr>
-                        <m:chr m:val="⃗"/>
-                        <m:ctrlPr>
-                          <a:rPr lang="en-US" b="0" i="1" smtClean="0">
-                            <a:latin typeface="Cambria Math" panose="02040503050406030204" pitchFamily="18" charset="0"/>
-                          </a:rPr>
-                        </m:ctrlPr>
-                      </m:accPr>
-                      <m:e>
-                        <m:r>
-                          <a:rPr lang="en-US" b="0" i="1" smtClean="0">
-                            <a:latin typeface="Cambria Math" panose="02040503050406030204" pitchFamily="18" charset="0"/>
-                          </a:rPr>
-                          <m:t>𝑣</m:t>
-                        </m:r>
-                      </m:e>
-                    </m:acc>
-                    <m:r>
-                      <m:rPr>
-                        <m:sty m:val="p"/>
-                      </m:rPr>
-                      <a:rPr lang="en-US" b="0" i="0" smtClean="0">
-                        <a:latin typeface="Cambria Math" panose="02040503050406030204" pitchFamily="18" charset="0"/>
-                      </a:rPr>
-                      <m:t>Δt</m:t>
-                    </m:r>
-                  </m:oMath>
-                </a14:m>
-                <a:endParaRPr lang="en-US" b="0" dirty="0" smtClean="0"/>
-              </a:p>
-              <a:p>
-                <a:endParaRPr lang="en-US" dirty="0" smtClean="0"/>
-              </a:p>
-              <a:p>
-                <a:pPr marL="0" indent="0">
-                  <a:buNone/>
-                </a:pPr>
-                <a:r>
-                  <a:rPr lang="en-US" dirty="0" smtClean="0"/>
-                  <a:t>Do </a:t>
-                </a:r>
-                <a:r>
-                  <a:rPr lang="en-US" dirty="0" smtClean="0"/>
-                  <a:t>semi-implicit</a:t>
-                </a:r>
-                <a:r>
-                  <a:rPr lang="en-US" dirty="0" smtClean="0"/>
-                  <a:t>!</a:t>
-                </a:r>
                 <a:endParaRPr lang="en-US" dirty="0"/>
               </a:p>
             </p:txBody>
@@ -9093,10 +8831,14 @@
               </p:nvPr>
             </p:nvSpPr>
             <p:spPr>
+              <a:xfrm>
+                <a:off x="1419811" y="1579657"/>
+                <a:ext cx="2873829" cy="1461861"/>
+              </a:xfrm>
               <a:blipFill rotWithShape="0">
                 <a:blip r:embed="rId3"/>
                 <a:stretch>
-                  <a:fillRect l="-1217" t="-2241"/>
+                  <a:fillRect l="-4459" t="-6667"/>
                 </a:stretch>
               </a:blipFill>
             </p:spPr>
@@ -9115,89 +8857,626 @@
           </p:sp>
         </mc:Fallback>
       </mc:AlternateContent>
-      <p:sp>
-        <p:nvSpPr>
-          <p:cNvPr id="4" name="Rectangle 3"/>
-          <p:cNvSpPr/>
+      <p:pic>
+        <p:nvPicPr>
+          <p:cNvPr id="6" name="Picture 5"/>
+          <p:cNvPicPr>
+            <a:picLocks noChangeAspect="1"/>
+          </p:cNvPicPr>
           <p:nvPr/>
-        </p:nvSpPr>
+        </p:nvPicPr>
+        <p:blipFill>
+          <a:blip r:embed="rId4"/>
+          <a:stretch>
+            <a:fillRect/>
+          </a:stretch>
+        </p:blipFill>
         <p:spPr>
           <a:xfrm>
-            <a:off x="6379029" y="1132114"/>
-            <a:ext cx="3516085" cy="1970315"/>
+            <a:off x="1415434" y="2893785"/>
+            <a:ext cx="2724530" cy="2724530"/>
           </a:xfrm>
           <a:prstGeom prst="rect">
             <a:avLst/>
           </a:prstGeom>
         </p:spPr>
-        <p:style>
-          <a:lnRef idx="2">
-            <a:schemeClr val="accent1">
-              <a:shade val="50000"/>
-            </a:schemeClr>
-          </a:lnRef>
-          <a:fillRef idx="1">
-            <a:schemeClr val="accent1"/>
-          </a:fillRef>
-          <a:effectRef idx="0">
-            <a:schemeClr val="accent1"/>
-          </a:effectRef>
-          <a:fontRef idx="minor">
-            <a:schemeClr val="lt1"/>
-          </a:fontRef>
-        </p:style>
-        <p:txBody>
-          <a:bodyPr rtlCol="0" anchor="ctr"/>
-          <a:lstStyle/>
-          <a:p>
-            <a:pPr algn="ctr"/>
-            <a:r>
-              <a:rPr lang="en-US" dirty="0" smtClean="0"/>
-              <a:t>Explicit Euler picture</a:t>
-            </a:r>
-            <a:endParaRPr lang="en-US" dirty="0"/>
-          </a:p>
-        </p:txBody>
-      </p:sp>
-      <p:sp>
-        <p:nvSpPr>
-          <p:cNvPr id="5" name="Rectangle 4"/>
-          <p:cNvSpPr/>
+      </p:pic>
+      <p:pic>
+        <p:nvPicPr>
+          <p:cNvPr id="7" name="Picture 6"/>
+          <p:cNvPicPr>
+            <a:picLocks noChangeAspect="1"/>
+          </p:cNvPicPr>
           <p:nvPr/>
-        </p:nvSpPr>
+        </p:nvPicPr>
+        <p:blipFill>
+          <a:blip r:embed="rId5"/>
+          <a:stretch>
+            <a:fillRect/>
+          </a:stretch>
+        </p:blipFill>
         <p:spPr>
           <a:xfrm>
-            <a:off x="6172200" y="3654538"/>
-            <a:ext cx="3516085" cy="1970315"/>
+            <a:off x="7438044" y="3225200"/>
+            <a:ext cx="2219635" cy="2191056"/>
           </a:xfrm>
           <a:prstGeom prst="rect">
             <a:avLst/>
           </a:prstGeom>
         </p:spPr>
-        <p:style>
-          <a:lnRef idx="2">
-            <a:schemeClr val="accent1">
-              <a:shade val="50000"/>
-            </a:schemeClr>
-          </a:lnRef>
-          <a:fillRef idx="1">
-            <a:schemeClr val="accent1"/>
-          </a:fillRef>
-          <a:effectRef idx="0">
-            <a:schemeClr val="accent1"/>
-          </a:effectRef>
-          <a:fontRef idx="minor">
-            <a:schemeClr val="lt1"/>
-          </a:fontRef>
-        </p:style>
-        <p:txBody>
-          <a:bodyPr rtlCol="0" anchor="ctr"/>
-          <a:lstStyle/>
-          <a:p>
-            <a:pPr algn="ctr"/>
-            <a:r>
-              <a:rPr lang="en-US" dirty="0" smtClean="0"/>
-              <a:t>Semi-implicit Euler picture</a:t>
+      </p:pic>
+      <mc:AlternateContent xmlns:mc="http://schemas.openxmlformats.org/markup-compatibility/2006">
+        <mc:Choice xmlns:a14="http://schemas.microsoft.com/office/drawing/2010/main" Requires="a14">
+          <p:sp>
+            <p:nvSpPr>
+              <p:cNvPr id="8" name="Content Placeholder 2"/>
+              <p:cNvSpPr txBox="1">
+                <a:spLocks/>
+              </p:cNvSpPr>
+              <p:nvPr/>
+            </p:nvSpPr>
+            <p:spPr>
+              <a:xfrm>
+                <a:off x="6999514" y="1577469"/>
+                <a:ext cx="3265716" cy="1530915"/>
+              </a:xfrm>
+              <a:prstGeom prst="rect">
+                <a:avLst/>
+              </a:prstGeom>
+            </p:spPr>
+            <p:txBody>
+              <a:bodyPr vert="horz" lIns="91440" tIns="45720" rIns="91440" bIns="45720" rtlCol="0">
+                <a:normAutofit/>
+              </a:bodyPr>
+              <a:lstStyle>
+                <a:lvl1pPr marL="228600" indent="-228600" algn="l" defTabSz="914400" rtl="0" eaLnBrk="1" latinLnBrk="0" hangingPunct="1">
+                  <a:lnSpc>
+                    <a:spcPct val="90000"/>
+                  </a:lnSpc>
+                  <a:spcBef>
+                    <a:spcPts val="1000"/>
+                  </a:spcBef>
+                  <a:buFont typeface="Arial" panose="020B0604020202020204" pitchFamily="34" charset="0"/>
+                  <a:buChar char="•"/>
+                  <a:defRPr sz="2800" kern="1200">
+                    <a:solidFill>
+                      <a:schemeClr val="tx1"/>
+                    </a:solidFill>
+                    <a:latin typeface="+mn-lt"/>
+                    <a:ea typeface="+mn-ea"/>
+                    <a:cs typeface="+mn-cs"/>
+                  </a:defRPr>
+                </a:lvl1pPr>
+                <a:lvl2pPr marL="685800" indent="-228600" algn="l" defTabSz="914400" rtl="0" eaLnBrk="1" latinLnBrk="0" hangingPunct="1">
+                  <a:lnSpc>
+                    <a:spcPct val="90000"/>
+                  </a:lnSpc>
+                  <a:spcBef>
+                    <a:spcPts val="500"/>
+                  </a:spcBef>
+                  <a:buFont typeface="Arial" panose="020B0604020202020204" pitchFamily="34" charset="0"/>
+                  <a:buChar char="•"/>
+                  <a:defRPr sz="2400" kern="1200">
+                    <a:solidFill>
+                      <a:schemeClr val="tx1"/>
+                    </a:solidFill>
+                    <a:latin typeface="+mn-lt"/>
+                    <a:ea typeface="+mn-ea"/>
+                    <a:cs typeface="+mn-cs"/>
+                  </a:defRPr>
+                </a:lvl2pPr>
+                <a:lvl3pPr marL="1143000" indent="-228600" algn="l" defTabSz="914400" rtl="0" eaLnBrk="1" latinLnBrk="0" hangingPunct="1">
+                  <a:lnSpc>
+                    <a:spcPct val="90000"/>
+                  </a:lnSpc>
+                  <a:spcBef>
+                    <a:spcPts val="500"/>
+                  </a:spcBef>
+                  <a:buFont typeface="Arial" panose="020B0604020202020204" pitchFamily="34" charset="0"/>
+                  <a:buChar char="•"/>
+                  <a:defRPr sz="2000" kern="1200">
+                    <a:solidFill>
+                      <a:schemeClr val="tx1"/>
+                    </a:solidFill>
+                    <a:latin typeface="+mn-lt"/>
+                    <a:ea typeface="+mn-ea"/>
+                    <a:cs typeface="+mn-cs"/>
+                  </a:defRPr>
+                </a:lvl3pPr>
+                <a:lvl4pPr marL="1600200" indent="-228600" algn="l" defTabSz="914400" rtl="0" eaLnBrk="1" latinLnBrk="0" hangingPunct="1">
+                  <a:lnSpc>
+                    <a:spcPct val="90000"/>
+                  </a:lnSpc>
+                  <a:spcBef>
+                    <a:spcPts val="500"/>
+                  </a:spcBef>
+                  <a:buFont typeface="Arial" panose="020B0604020202020204" pitchFamily="34" charset="0"/>
+                  <a:buChar char="•"/>
+                  <a:defRPr sz="1800" kern="1200">
+                    <a:solidFill>
+                      <a:schemeClr val="tx1"/>
+                    </a:solidFill>
+                    <a:latin typeface="+mn-lt"/>
+                    <a:ea typeface="+mn-ea"/>
+                    <a:cs typeface="+mn-cs"/>
+                  </a:defRPr>
+                </a:lvl4pPr>
+                <a:lvl5pPr marL="2057400" indent="-228600" algn="l" defTabSz="914400" rtl="0" eaLnBrk="1" latinLnBrk="0" hangingPunct="1">
+                  <a:lnSpc>
+                    <a:spcPct val="90000"/>
+                  </a:lnSpc>
+                  <a:spcBef>
+                    <a:spcPts val="500"/>
+                  </a:spcBef>
+                  <a:buFont typeface="Arial" panose="020B0604020202020204" pitchFamily="34" charset="0"/>
+                  <a:buChar char="•"/>
+                  <a:defRPr sz="1800" kern="1200">
+                    <a:solidFill>
+                      <a:schemeClr val="tx1"/>
+                    </a:solidFill>
+                    <a:latin typeface="+mn-lt"/>
+                    <a:ea typeface="+mn-ea"/>
+                    <a:cs typeface="+mn-cs"/>
+                  </a:defRPr>
+                </a:lvl5pPr>
+                <a:lvl6pPr marL="2514600" indent="-228600" algn="l" defTabSz="914400" rtl="0" eaLnBrk="1" latinLnBrk="0" hangingPunct="1">
+                  <a:lnSpc>
+                    <a:spcPct val="90000"/>
+                  </a:lnSpc>
+                  <a:spcBef>
+                    <a:spcPts val="500"/>
+                  </a:spcBef>
+                  <a:buFont typeface="Arial" panose="020B0604020202020204" pitchFamily="34" charset="0"/>
+                  <a:buChar char="•"/>
+                  <a:defRPr sz="1800" kern="1200">
+                    <a:solidFill>
+                      <a:schemeClr val="tx1"/>
+                    </a:solidFill>
+                    <a:latin typeface="+mn-lt"/>
+                    <a:ea typeface="+mn-ea"/>
+                    <a:cs typeface="+mn-cs"/>
+                  </a:defRPr>
+                </a:lvl6pPr>
+                <a:lvl7pPr marL="2971800" indent="-228600" algn="l" defTabSz="914400" rtl="0" eaLnBrk="1" latinLnBrk="0" hangingPunct="1">
+                  <a:lnSpc>
+                    <a:spcPct val="90000"/>
+                  </a:lnSpc>
+                  <a:spcBef>
+                    <a:spcPts val="500"/>
+                  </a:spcBef>
+                  <a:buFont typeface="Arial" panose="020B0604020202020204" pitchFamily="34" charset="0"/>
+                  <a:buChar char="•"/>
+                  <a:defRPr sz="1800" kern="1200">
+                    <a:solidFill>
+                      <a:schemeClr val="tx1"/>
+                    </a:solidFill>
+                    <a:latin typeface="+mn-lt"/>
+                    <a:ea typeface="+mn-ea"/>
+                    <a:cs typeface="+mn-cs"/>
+                  </a:defRPr>
+                </a:lvl7pPr>
+                <a:lvl8pPr marL="3429000" indent="-228600" algn="l" defTabSz="914400" rtl="0" eaLnBrk="1" latinLnBrk="0" hangingPunct="1">
+                  <a:lnSpc>
+                    <a:spcPct val="90000"/>
+                  </a:lnSpc>
+                  <a:spcBef>
+                    <a:spcPts val="500"/>
+                  </a:spcBef>
+                  <a:buFont typeface="Arial" panose="020B0604020202020204" pitchFamily="34" charset="0"/>
+                  <a:buChar char="•"/>
+                  <a:defRPr sz="1800" kern="1200">
+                    <a:solidFill>
+                      <a:schemeClr val="tx1"/>
+                    </a:solidFill>
+                    <a:latin typeface="+mn-lt"/>
+                    <a:ea typeface="+mn-ea"/>
+                    <a:cs typeface="+mn-cs"/>
+                  </a:defRPr>
+                </a:lvl8pPr>
+                <a:lvl9pPr marL="3886200" indent="-228600" algn="l" defTabSz="914400" rtl="0" eaLnBrk="1" latinLnBrk="0" hangingPunct="1">
+                  <a:lnSpc>
+                    <a:spcPct val="90000"/>
+                  </a:lnSpc>
+                  <a:spcBef>
+                    <a:spcPts val="500"/>
+                  </a:spcBef>
+                  <a:buFont typeface="Arial" panose="020B0604020202020204" pitchFamily="34" charset="0"/>
+                  <a:buChar char="•"/>
+                  <a:defRPr sz="1800" kern="1200">
+                    <a:solidFill>
+                      <a:schemeClr val="tx1"/>
+                    </a:solidFill>
+                    <a:latin typeface="+mn-lt"/>
+                    <a:ea typeface="+mn-ea"/>
+                    <a:cs typeface="+mn-cs"/>
+                  </a:defRPr>
+                </a:lvl9pPr>
+              </a:lstStyle>
+              <a:p>
+                <a:pPr marL="0" indent="0">
+                  <a:buFont typeface="Arial" panose="020B0604020202020204" pitchFamily="34" charset="0"/>
+                  <a:buNone/>
+                </a:pPr>
+                <a:r>
+                  <a:rPr lang="en-US" dirty="0" smtClean="0"/>
+                  <a:t>Semi-implicit </a:t>
+                </a:r>
+                <a:r>
+                  <a:rPr lang="en-US" dirty="0" smtClean="0"/>
+                  <a:t>Euler</a:t>
+                </a:r>
+              </a:p>
+              <a:p>
+                <a:pPr marL="914400" lvl="1" indent="-457200">
+                  <a:buFont typeface="+mj-lt"/>
+                  <a:buAutoNum type="arabicPeriod"/>
+                </a:pPr>
+                <a14:m>
+                  <m:oMath xmlns:m="http://schemas.openxmlformats.org/officeDocument/2006/math">
+                    <m:acc>
+                      <m:accPr>
+                        <m:chr m:val="⃗"/>
+                        <m:ctrlPr>
+                          <a:rPr lang="en-US" i="1" smtClean="0">
+                            <a:latin typeface="Cambria Math" panose="02040503050406030204" pitchFamily="18" charset="0"/>
+                          </a:rPr>
+                        </m:ctrlPr>
+                      </m:accPr>
+                      <m:e>
+                        <m:r>
+                          <a:rPr lang="en-US" i="1" smtClean="0">
+                            <a:latin typeface="Cambria Math" panose="02040503050406030204" pitchFamily="18" charset="0"/>
+                          </a:rPr>
+                          <m:t>𝑣</m:t>
+                        </m:r>
+                      </m:e>
+                    </m:acc>
+                    <m:r>
+                      <a:rPr lang="en-US" i="1" dirty="0" smtClean="0">
+                        <a:latin typeface="Cambria Math" panose="02040503050406030204" pitchFamily="18" charset="0"/>
+                      </a:rPr>
+                      <m:t>+=</m:t>
+                    </m:r>
+                    <m:acc>
+                      <m:accPr>
+                        <m:chr m:val="⃗"/>
+                        <m:ctrlPr>
+                          <a:rPr lang="en-US" i="1" dirty="0" smtClean="0">
+                            <a:latin typeface="Cambria Math" panose="02040503050406030204" pitchFamily="18" charset="0"/>
+                          </a:rPr>
+                        </m:ctrlPr>
+                      </m:accPr>
+                      <m:e>
+                        <m:r>
+                          <a:rPr lang="en-US" i="1" dirty="0" smtClean="0">
+                            <a:latin typeface="Cambria Math" panose="02040503050406030204" pitchFamily="18" charset="0"/>
+                          </a:rPr>
+                          <m:t>𝑎</m:t>
+                        </m:r>
+                      </m:e>
+                    </m:acc>
+                    <m:r>
+                      <m:rPr>
+                        <m:sty m:val="p"/>
+                      </m:rPr>
+                      <a:rPr lang="en-US" dirty="0" smtClean="0">
+                        <a:latin typeface="Cambria Math" panose="02040503050406030204" pitchFamily="18" charset="0"/>
+                      </a:rPr>
+                      <m:t>Δ</m:t>
+                    </m:r>
+                    <m:r>
+                      <a:rPr lang="en-US" i="1" dirty="0" smtClean="0">
+                        <a:latin typeface="Cambria Math" panose="02040503050406030204" pitchFamily="18" charset="0"/>
+                      </a:rPr>
+                      <m:t>𝑡</m:t>
+                    </m:r>
+                  </m:oMath>
+                </a14:m>
+                <a:endParaRPr lang="en-US" i="1" dirty="0" smtClean="0">
+                  <a:latin typeface="Cambria Math" panose="02040503050406030204" pitchFamily="18" charset="0"/>
+                </a:endParaRPr>
+              </a:p>
+              <a:p>
+                <a:pPr marL="914400" lvl="1" indent="-457200">
+                  <a:buFont typeface="+mj-lt"/>
+                  <a:buAutoNum type="arabicPeriod"/>
+                </a:pPr>
+                <a14:m>
+                  <m:oMath xmlns:m="http://schemas.openxmlformats.org/officeDocument/2006/math">
+                    <m:acc>
+                      <m:accPr>
+                        <m:chr m:val="⃗"/>
+                        <m:ctrlPr>
+                          <a:rPr lang="en-US" i="1" smtClean="0">
+                            <a:latin typeface="Cambria Math" panose="02040503050406030204" pitchFamily="18" charset="0"/>
+                          </a:rPr>
+                        </m:ctrlPr>
+                      </m:accPr>
+                      <m:e>
+                        <m:r>
+                          <a:rPr lang="en-US" i="1" smtClean="0">
+                            <a:latin typeface="Cambria Math" panose="02040503050406030204" pitchFamily="18" charset="0"/>
+                          </a:rPr>
+                          <m:t>𝑝</m:t>
+                        </m:r>
+                      </m:e>
+                    </m:acc>
+                    <m:r>
+                      <a:rPr lang="en-US" i="1" smtClean="0">
+                        <a:latin typeface="Cambria Math" panose="02040503050406030204" pitchFamily="18" charset="0"/>
+                      </a:rPr>
+                      <m:t>+=</m:t>
+                    </m:r>
+                    <m:acc>
+                      <m:accPr>
+                        <m:chr m:val="⃗"/>
+                        <m:ctrlPr>
+                          <a:rPr lang="en-US" i="1" smtClean="0">
+                            <a:latin typeface="Cambria Math" panose="02040503050406030204" pitchFamily="18" charset="0"/>
+                          </a:rPr>
+                        </m:ctrlPr>
+                      </m:accPr>
+                      <m:e>
+                        <m:r>
+                          <a:rPr lang="en-US" i="1" smtClean="0">
+                            <a:latin typeface="Cambria Math" panose="02040503050406030204" pitchFamily="18" charset="0"/>
+                          </a:rPr>
+                          <m:t>𝑣</m:t>
+                        </m:r>
+                      </m:e>
+                    </m:acc>
+                    <m:r>
+                      <m:rPr>
+                        <m:sty m:val="p"/>
+                      </m:rPr>
+                      <a:rPr lang="en-US" smtClean="0">
+                        <a:latin typeface="Cambria Math" panose="02040503050406030204" pitchFamily="18" charset="0"/>
+                      </a:rPr>
+                      <m:t>Δt</m:t>
+                    </m:r>
+                  </m:oMath>
+                </a14:m>
+                <a:endParaRPr lang="en-US" dirty="0"/>
+              </a:p>
+            </p:txBody>
+          </p:sp>
+        </mc:Choice>
+        <mc:Fallback>
+          <p:sp>
+            <p:nvSpPr>
+              <p:cNvPr id="8" name="Content Placeholder 2"/>
+              <p:cNvSpPr txBox="1">
+                <a:spLocks noRot="1" noChangeAspect="1" noMove="1" noResize="1" noEditPoints="1" noAdjustHandles="1" noChangeArrowheads="1" noChangeShapeType="1" noTextEdit="1"/>
+              </p:cNvSpPr>
+              <p:nvPr/>
+            </p:nvSpPr>
+            <p:spPr>
+              <a:xfrm>
+                <a:off x="6999514" y="1577469"/>
+                <a:ext cx="3265716" cy="1530915"/>
+              </a:xfrm>
+              <a:prstGeom prst="rect">
+                <a:avLst/>
+              </a:prstGeom>
+              <a:blipFill rotWithShape="0">
+                <a:blip r:embed="rId6"/>
+                <a:stretch>
+                  <a:fillRect l="-3731" t="-6773"/>
+                </a:stretch>
+              </a:blipFill>
+            </p:spPr>
+            <p:txBody>
+              <a:bodyPr/>
+              <a:lstStyle/>
+              <a:p>
+                <a:r>
+                  <a:rPr lang="en-US">
+                    <a:noFill/>
+                  </a:rPr>
+                  <a:t> </a:t>
+                </a:r>
+              </a:p>
+            </p:txBody>
+          </p:sp>
+        </mc:Fallback>
+      </mc:AlternateContent>
+      <p:sp>
+        <p:nvSpPr>
+          <p:cNvPr id="9" name="Content Placeholder 2"/>
+          <p:cNvSpPr txBox="1">
+            <a:spLocks/>
+          </p:cNvSpPr>
+          <p:nvPr/>
+        </p:nvSpPr>
+        <p:spPr>
+          <a:xfrm>
+            <a:off x="4624337" y="6056996"/>
+            <a:ext cx="2813707" cy="559704"/>
+          </a:xfrm>
+          <a:prstGeom prst="rect">
+            <a:avLst/>
+          </a:prstGeom>
+        </p:spPr>
+        <p:txBody>
+          <a:bodyPr vert="horz" lIns="91440" tIns="45720" rIns="91440" bIns="45720" rtlCol="0">
+            <a:normAutofit/>
+          </a:bodyPr>
+          <a:lstStyle>
+            <a:lvl1pPr marL="228600" indent="-228600" algn="l" defTabSz="914400" rtl="0" eaLnBrk="1" latinLnBrk="0" hangingPunct="1">
+              <a:lnSpc>
+                <a:spcPct val="90000"/>
+              </a:lnSpc>
+              <a:spcBef>
+                <a:spcPts val="1000"/>
+              </a:spcBef>
+              <a:buFont typeface="Arial" panose="020B0604020202020204" pitchFamily="34" charset="0"/>
+              <a:buChar char="•"/>
+              <a:defRPr sz="2800" kern="1200">
+                <a:solidFill>
+                  <a:schemeClr val="tx1"/>
+                </a:solidFill>
+                <a:latin typeface="+mn-lt"/>
+                <a:ea typeface="+mn-ea"/>
+                <a:cs typeface="+mn-cs"/>
+              </a:defRPr>
+            </a:lvl1pPr>
+            <a:lvl2pPr marL="685800" indent="-228600" algn="l" defTabSz="914400" rtl="0" eaLnBrk="1" latinLnBrk="0" hangingPunct="1">
+              <a:lnSpc>
+                <a:spcPct val="90000"/>
+              </a:lnSpc>
+              <a:spcBef>
+                <a:spcPts val="500"/>
+              </a:spcBef>
+              <a:buFont typeface="Arial" panose="020B0604020202020204" pitchFamily="34" charset="0"/>
+              <a:buChar char="•"/>
+              <a:defRPr sz="2400" kern="1200">
+                <a:solidFill>
+                  <a:schemeClr val="tx1"/>
+                </a:solidFill>
+                <a:latin typeface="+mn-lt"/>
+                <a:ea typeface="+mn-ea"/>
+                <a:cs typeface="+mn-cs"/>
+              </a:defRPr>
+            </a:lvl2pPr>
+            <a:lvl3pPr marL="1143000" indent="-228600" algn="l" defTabSz="914400" rtl="0" eaLnBrk="1" latinLnBrk="0" hangingPunct="1">
+              <a:lnSpc>
+                <a:spcPct val="90000"/>
+              </a:lnSpc>
+              <a:spcBef>
+                <a:spcPts val="500"/>
+              </a:spcBef>
+              <a:buFont typeface="Arial" panose="020B0604020202020204" pitchFamily="34" charset="0"/>
+              <a:buChar char="•"/>
+              <a:defRPr sz="2000" kern="1200">
+                <a:solidFill>
+                  <a:schemeClr val="tx1"/>
+                </a:solidFill>
+                <a:latin typeface="+mn-lt"/>
+                <a:ea typeface="+mn-ea"/>
+                <a:cs typeface="+mn-cs"/>
+              </a:defRPr>
+            </a:lvl3pPr>
+            <a:lvl4pPr marL="1600200" indent="-228600" algn="l" defTabSz="914400" rtl="0" eaLnBrk="1" latinLnBrk="0" hangingPunct="1">
+              <a:lnSpc>
+                <a:spcPct val="90000"/>
+              </a:lnSpc>
+              <a:spcBef>
+                <a:spcPts val="500"/>
+              </a:spcBef>
+              <a:buFont typeface="Arial" panose="020B0604020202020204" pitchFamily="34" charset="0"/>
+              <a:buChar char="•"/>
+              <a:defRPr sz="1800" kern="1200">
+                <a:solidFill>
+                  <a:schemeClr val="tx1"/>
+                </a:solidFill>
+                <a:latin typeface="+mn-lt"/>
+                <a:ea typeface="+mn-ea"/>
+                <a:cs typeface="+mn-cs"/>
+              </a:defRPr>
+            </a:lvl4pPr>
+            <a:lvl5pPr marL="2057400" indent="-228600" algn="l" defTabSz="914400" rtl="0" eaLnBrk="1" latinLnBrk="0" hangingPunct="1">
+              <a:lnSpc>
+                <a:spcPct val="90000"/>
+              </a:lnSpc>
+              <a:spcBef>
+                <a:spcPts val="500"/>
+              </a:spcBef>
+              <a:buFont typeface="Arial" panose="020B0604020202020204" pitchFamily="34" charset="0"/>
+              <a:buChar char="•"/>
+              <a:defRPr sz="1800" kern="1200">
+                <a:solidFill>
+                  <a:schemeClr val="tx1"/>
+                </a:solidFill>
+                <a:latin typeface="+mn-lt"/>
+                <a:ea typeface="+mn-ea"/>
+                <a:cs typeface="+mn-cs"/>
+              </a:defRPr>
+            </a:lvl5pPr>
+            <a:lvl6pPr marL="2514600" indent="-228600" algn="l" defTabSz="914400" rtl="0" eaLnBrk="1" latinLnBrk="0" hangingPunct="1">
+              <a:lnSpc>
+                <a:spcPct val="90000"/>
+              </a:lnSpc>
+              <a:spcBef>
+                <a:spcPts val="500"/>
+              </a:spcBef>
+              <a:buFont typeface="Arial" panose="020B0604020202020204" pitchFamily="34" charset="0"/>
+              <a:buChar char="•"/>
+              <a:defRPr sz="1800" kern="1200">
+                <a:solidFill>
+                  <a:schemeClr val="tx1"/>
+                </a:solidFill>
+                <a:latin typeface="+mn-lt"/>
+                <a:ea typeface="+mn-ea"/>
+                <a:cs typeface="+mn-cs"/>
+              </a:defRPr>
+            </a:lvl6pPr>
+            <a:lvl7pPr marL="2971800" indent="-228600" algn="l" defTabSz="914400" rtl="0" eaLnBrk="1" latinLnBrk="0" hangingPunct="1">
+              <a:lnSpc>
+                <a:spcPct val="90000"/>
+              </a:lnSpc>
+              <a:spcBef>
+                <a:spcPts val="500"/>
+              </a:spcBef>
+              <a:buFont typeface="Arial" panose="020B0604020202020204" pitchFamily="34" charset="0"/>
+              <a:buChar char="•"/>
+              <a:defRPr sz="1800" kern="1200">
+                <a:solidFill>
+                  <a:schemeClr val="tx1"/>
+                </a:solidFill>
+                <a:latin typeface="+mn-lt"/>
+                <a:ea typeface="+mn-ea"/>
+                <a:cs typeface="+mn-cs"/>
+              </a:defRPr>
+            </a:lvl7pPr>
+            <a:lvl8pPr marL="3429000" indent="-228600" algn="l" defTabSz="914400" rtl="0" eaLnBrk="1" latinLnBrk="0" hangingPunct="1">
+              <a:lnSpc>
+                <a:spcPct val="90000"/>
+              </a:lnSpc>
+              <a:spcBef>
+                <a:spcPts val="500"/>
+              </a:spcBef>
+              <a:buFont typeface="Arial" panose="020B0604020202020204" pitchFamily="34" charset="0"/>
+              <a:buChar char="•"/>
+              <a:defRPr sz="1800" kern="1200">
+                <a:solidFill>
+                  <a:schemeClr val="tx1"/>
+                </a:solidFill>
+                <a:latin typeface="+mn-lt"/>
+                <a:ea typeface="+mn-ea"/>
+                <a:cs typeface="+mn-cs"/>
+              </a:defRPr>
+            </a:lvl8pPr>
+            <a:lvl9pPr marL="3886200" indent="-228600" algn="l" defTabSz="914400" rtl="0" eaLnBrk="1" latinLnBrk="0" hangingPunct="1">
+              <a:lnSpc>
+                <a:spcPct val="90000"/>
+              </a:lnSpc>
+              <a:spcBef>
+                <a:spcPts val="500"/>
+              </a:spcBef>
+              <a:buFont typeface="Arial" panose="020B0604020202020204" pitchFamily="34" charset="0"/>
+              <a:buChar char="•"/>
+              <a:defRPr sz="1800" kern="1200">
+                <a:solidFill>
+                  <a:schemeClr val="tx1"/>
+                </a:solidFill>
+                <a:latin typeface="+mn-lt"/>
+                <a:ea typeface="+mn-ea"/>
+                <a:cs typeface="+mn-cs"/>
+              </a:defRPr>
+            </a:lvl9pPr>
+          </a:lstStyle>
+          <a:p>
+            <a:pPr marL="0" indent="0">
+              <a:buFont typeface="Arial" panose="020B0604020202020204" pitchFamily="34" charset="0"/>
+              <a:buNone/>
+            </a:pPr>
+            <a:r>
+              <a:rPr lang="en-US" dirty="0" smtClean="0"/>
+              <a:t>Do </a:t>
+            </a:r>
+            <a:r>
+              <a:rPr lang="en-US" dirty="0" smtClean="0"/>
+              <a:t>semi-implicit!</a:t>
             </a:r>
             <a:endParaRPr lang="en-US" dirty="0"/>
           </a:p>
@@ -9276,15 +9555,7 @@
             </a:pPr>
             <a:r>
               <a:rPr lang="en-US" dirty="0" smtClean="0"/>
-              <a:t>Broken up into </a:t>
-            </a:r>
-            <a:r>
-              <a:rPr lang="en-US" dirty="0" smtClean="0"/>
-              <a:t>three main </a:t>
-            </a:r>
-            <a:r>
-              <a:rPr lang="en-US" dirty="0" smtClean="0"/>
-              <a:t>phases:</a:t>
+              <a:t>Broken up into three main phases:</a:t>
             </a:r>
           </a:p>
           <a:p>
@@ -9309,7 +9580,6 @@
               <a:rPr lang="en-US" dirty="0" smtClean="0"/>
               <a:t>All object -&gt; Pairs of objects</a:t>
             </a:r>
-            <a:endParaRPr lang="en-US" dirty="0" smtClean="0"/>
           </a:p>
           <a:p>
             <a:pPr marL="914400" lvl="1" indent="-457200">
@@ -9356,7 +9626,6 @@
               <a:rPr lang="en-US" dirty="0" smtClean="0"/>
               <a:t>pairs of primitives -&gt; intersecting pairs</a:t>
             </a:r>
-            <a:endParaRPr lang="en-US" dirty="0" smtClean="0"/>
           </a:p>
         </p:txBody>
       </p:sp>
@@ -9462,17 +9731,8 @@
             </a:pPr>
             <a:r>
               <a:rPr lang="en-US" dirty="0" smtClean="0"/>
-              <a:t>Find possible </a:t>
-            </a:r>
-            <a:r>
-              <a:rPr lang="en-US" dirty="0" smtClean="0"/>
-              <a:t>pairs </a:t>
-            </a:r>
-            <a:r>
-              <a:rPr lang="en-US" dirty="0" smtClean="0"/>
-              <a:t>(returns false-positives)</a:t>
-            </a:r>
-            <a:endParaRPr lang="en-US" dirty="0" smtClean="0"/>
+              <a:t>Find possible pairs (returns false-positives)</a:t>
+            </a:r>
           </a:p>
         </p:txBody>
       </p:sp>
@@ -10235,11 +10495,7 @@
             </a:pPr>
             <a:r>
               <a:rPr lang="en-US" dirty="0" smtClean="0"/>
-              <a:t>If needed</a:t>
-            </a:r>
-            <a:r>
-              <a:rPr lang="en-US" dirty="0" smtClean="0"/>
-              <a:t>, switch to dynamic </a:t>
+              <a:t>If needed, switch to dynamic </a:t>
             </a:r>
             <a:r>
               <a:rPr lang="en-US" dirty="0" err="1" smtClean="0"/>
@@ -10262,7 +10518,6 @@
               <a:rPr lang="en-US" dirty="0" smtClean="0"/>
               <a:t>“Best” all-purpose spatial partition</a:t>
             </a:r>
-            <a:endParaRPr lang="en-US" dirty="0" smtClean="0"/>
           </a:p>
         </p:txBody>
       </p:sp>
@@ -10345,7 +10600,6 @@
               <a:rPr lang="en-US" dirty="0" smtClean="0"/>
               <a:t>Determines if two primitive pairs intersect</a:t>
             </a:r>
-            <a:endParaRPr lang="en-US" dirty="0" smtClean="0"/>
           </a:p>
           <a:p>
             <a:pPr marL="0" indent="0">
@@ -10389,7 +10643,6 @@
               <a:rPr lang="en-US" dirty="0" smtClean="0"/>
               <a:t>/Sphere</a:t>
             </a:r>
-            <a:endParaRPr lang="en-US" dirty="0" smtClean="0"/>
           </a:p>
           <a:p>
             <a:pPr lvl="1"/>
@@ -10414,11 +10667,7 @@
             </a:pPr>
             <a:r>
               <a:rPr lang="en-US" dirty="0" smtClean="0"/>
-              <a:t>Simple </a:t>
-            </a:r>
-            <a:r>
-              <a:rPr lang="en-US" dirty="0" smtClean="0"/>
-              <a:t>shapes tend to have hand-written tests</a:t>
+              <a:t>Simple shapes tend to have hand-written tests</a:t>
             </a:r>
           </a:p>
           <a:p>
@@ -10514,13 +10763,8 @@
             </a:pPr>
             <a:r>
               <a:rPr lang="en-US" dirty="0" smtClean="0"/>
-              <a:t>Resolution needs information about how objects </a:t>
-            </a:r>
-            <a:r>
-              <a:rPr lang="en-US" dirty="0" smtClean="0"/>
-              <a:t>collided</a:t>
-            </a:r>
-            <a:endParaRPr lang="en-US" dirty="0" smtClean="0"/>
+              <a:t>Resolution needs information about how objects collided</a:t>
+            </a:r>
           </a:p>
         </p:txBody>
       </p:sp>
@@ -11040,17 +11284,8 @@
             </a:pPr>
             <a:r>
               <a:rPr lang="en-US" dirty="0" smtClean="0"/>
-              <a:t>All </a:t>
-            </a:r>
-            <a:r>
-              <a:rPr lang="en-US" dirty="0" smtClean="0"/>
-              <a:t>about making believable </a:t>
-            </a:r>
-            <a:r>
-              <a:rPr lang="en-US" dirty="0" smtClean="0"/>
-              <a:t>interactions</a:t>
-            </a:r>
-            <a:endParaRPr lang="en-US" dirty="0" smtClean="0"/>
+              <a:t>All about making believable interactions</a:t>
+            </a:r>
           </a:p>
           <a:p>
             <a:pPr marL="0" indent="0">
@@ -11060,7 +11295,6 @@
               <a:rPr lang="en-US" dirty="0" smtClean="0"/>
               <a:t>Approximate real world for speed and stability</a:t>
             </a:r>
-            <a:endParaRPr lang="en-US" dirty="0" smtClean="0"/>
           </a:p>
           <a:p>
             <a:pPr marL="0" indent="0">
@@ -11562,7 +11796,6 @@
               <a:rPr lang="en-US" dirty="0" smtClean="0"/>
               <a:t>Turns object pairs into primitives (optional phase)</a:t>
             </a:r>
-            <a:endParaRPr lang="en-US" dirty="0" smtClean="0"/>
           </a:p>
         </p:txBody>
       </p:sp>
@@ -12122,15 +12355,7 @@
             </a:pPr>
             <a:r>
               <a:rPr lang="en-US" dirty="0" smtClean="0"/>
-              <a:t>Resolves collisions given mass </a:t>
-            </a:r>
-            <a:r>
-              <a:rPr lang="en-US" dirty="0" smtClean="0"/>
-              <a:t>and contact </a:t>
-            </a:r>
-            <a:r>
-              <a:rPr lang="en-US" dirty="0" smtClean="0"/>
-              <a:t>data</a:t>
+              <a:t>Resolves collisions given mass and contact data</a:t>
             </a:r>
           </a:p>
           <a:p>
@@ -12154,15 +12379,7 @@
             </a:pPr>
             <a:r>
               <a:rPr lang="en-US" dirty="0" smtClean="0"/>
-              <a:t>Most </a:t>
-            </a:r>
-            <a:r>
-              <a:rPr lang="en-US" dirty="0" smtClean="0"/>
-              <a:t>expensive </a:t>
-            </a:r>
-            <a:r>
-              <a:rPr lang="en-US" dirty="0" smtClean="0"/>
-              <a:t>phase!</a:t>
+              <a:t>Most expensive phase!</a:t>
             </a:r>
             <a:endParaRPr lang="en-US" dirty="0"/>
           </a:p>
@@ -12243,11 +12460,7 @@
             </a:pPr>
             <a:r>
               <a:rPr lang="en-US" dirty="0" smtClean="0"/>
-              <a:t>Two </a:t>
-            </a:r>
-            <a:r>
-              <a:rPr lang="en-US" dirty="0" smtClean="0"/>
-              <a:t>main approaches:</a:t>
+              <a:t>Two main approaches:</a:t>
             </a:r>
           </a:p>
           <a:p>
@@ -12258,7 +12471,6 @@
               <a:rPr lang="en-US" dirty="0" smtClean="0"/>
               <a:t>Impulses:</a:t>
             </a:r>
-            <a:endParaRPr lang="en-US" dirty="0" smtClean="0"/>
           </a:p>
           <a:p>
             <a:pPr lvl="1"/>
@@ -12730,7 +12942,6 @@
               <a:rPr lang="en-US" dirty="0" smtClean="0"/>
               <a:t>Get data organized on the space</a:t>
             </a:r>
-            <a:endParaRPr lang="en-US" dirty="0" smtClean="0"/>
           </a:p>
           <a:p>
             <a:pPr marL="0" indent="0">
@@ -13105,7 +13316,6 @@
               <a:rPr lang="en-US" dirty="0" smtClean="0"/>
               <a:t>Requires penetration resolution</a:t>
             </a:r>
-            <a:endParaRPr lang="en-US" dirty="0" smtClean="0"/>
           </a:p>
           <a:p>
             <a:pPr marL="0" indent="0">
@@ -13221,7 +13431,6 @@
               <a:rPr lang="en-US" dirty="0" smtClean="0"/>
               <a:t>Events</a:t>
             </a:r>
-            <a:endParaRPr lang="en-US" dirty="0" smtClean="0"/>
           </a:p>
           <a:p>
             <a:pPr marL="457200" lvl="1" indent="0">
@@ -13448,11 +13657,7 @@
             </a:pPr>
             <a:r>
               <a:rPr lang="en-US" dirty="0" smtClean="0"/>
-              <a:t>Rule 1</a:t>
-            </a:r>
-            <a:r>
-              <a:rPr lang="en-US" dirty="0" smtClean="0"/>
-              <a:t>: Debug Drawing</a:t>
+              <a:t>Rule 1: Debug Drawing</a:t>
             </a:r>
           </a:p>
           <a:p>
@@ -13461,11 +13666,7 @@
             </a:pPr>
             <a:r>
               <a:rPr lang="en-US" dirty="0" smtClean="0"/>
-              <a:t>Rule 2</a:t>
-            </a:r>
-            <a:r>
-              <a:rPr lang="en-US" dirty="0" smtClean="0"/>
-              <a:t>: Determinism</a:t>
+              <a:t>Rule 2: Determinism</a:t>
             </a:r>
           </a:p>
           <a:p>
@@ -13474,11 +13675,7 @@
             </a:pPr>
             <a:r>
               <a:rPr lang="en-US" dirty="0" smtClean="0"/>
-              <a:t>Rule 3</a:t>
-            </a:r>
-            <a:r>
-              <a:rPr lang="en-US" dirty="0" smtClean="0"/>
-              <a:t>: Pause/Step/Continue</a:t>
+              <a:t>Rule 3: Pause/Step/Continue</a:t>
             </a:r>
           </a:p>
           <a:p>
@@ -14020,11 +14217,7 @@
             </a:pPr>
             <a:r>
               <a:rPr lang="en-US" dirty="0" smtClean="0"/>
-              <a:t>1. Minus </a:t>
-            </a:r>
-            <a:r>
-              <a:rPr lang="en-US" dirty="0" smtClean="0"/>
-              <a:t>signs:</a:t>
+              <a:t>1. Minus signs:</a:t>
             </a:r>
           </a:p>
           <a:p>
@@ -14033,15 +14226,7 @@
             </a:pPr>
             <a:r>
               <a:rPr lang="en-US" dirty="0" smtClean="0"/>
-              <a:t>They’re </a:t>
-            </a:r>
-            <a:r>
-              <a:rPr lang="en-US" dirty="0" smtClean="0"/>
-              <a:t>everywhere and </a:t>
-            </a:r>
-            <a:r>
-              <a:rPr lang="en-US" dirty="0" smtClean="0"/>
-              <a:t>come in pairs</a:t>
+              <a:t>They’re everywhere and come in pairs</a:t>
             </a:r>
           </a:p>
           <a:p>
@@ -14050,11 +14235,7 @@
             </a:pPr>
             <a:r>
               <a:rPr lang="en-US" dirty="0" smtClean="0"/>
-              <a:t>Fixing one can make things look worse (when it’s more correct</a:t>
-            </a:r>
-            <a:r>
-              <a:rPr lang="en-US" dirty="0" smtClean="0"/>
-              <a:t>)</a:t>
+              <a:t>Fixing one can make things look worse (when it’s more correct)</a:t>
             </a:r>
           </a:p>
           <a:p>
@@ -14072,15 +14253,7 @@
             </a:pPr>
             <a:r>
               <a:rPr lang="en-US" dirty="0" smtClean="0"/>
-              <a:t>Intersection</a:t>
-            </a:r>
-            <a:r>
-              <a:rPr lang="en-US" dirty="0" smtClean="0"/>
-              <a:t>: consistent normal </a:t>
-            </a:r>
-            <a:r>
-              <a:rPr lang="en-US" dirty="0" smtClean="0"/>
-              <a:t>direction</a:t>
+              <a:t>Intersection: consistent normal direction</a:t>
             </a:r>
           </a:p>
           <a:p>
@@ -14200,17 +14373,8 @@
             </a:pPr>
             <a:r>
               <a:rPr lang="en-US" dirty="0" smtClean="0"/>
-              <a:t>Make </a:t>
-            </a:r>
-            <a:r>
-              <a:rPr lang="en-US" dirty="0" smtClean="0"/>
-              <a:t>sure everything is in the correct space (label them</a:t>
-            </a:r>
-            <a:r>
-              <a:rPr lang="en-US" dirty="0" smtClean="0"/>
-              <a:t>!)</a:t>
-            </a:r>
-            <a:endParaRPr lang="en-US" dirty="0" smtClean="0"/>
+              <a:t>Make sure everything is in the correct space (label them!)</a:t>
+            </a:r>
           </a:p>
           <a:p>
             <a:pPr lvl="2"/>
@@ -14223,11 +14387,7 @@
             <a:pPr lvl="2"/>
             <a:r>
               <a:rPr lang="en-US" dirty="0" smtClean="0"/>
-              <a:t>Inertia tensor (3d</a:t>
-            </a:r>
-            <a:r>
-              <a:rPr lang="en-US" dirty="0" smtClean="0"/>
-              <a:t>)</a:t>
+              <a:t>Inertia tensor (3d)</a:t>
             </a:r>
           </a:p>
           <a:p>
@@ -14240,7 +14400,6 @@
               <a:rPr lang="en-US" dirty="0" smtClean="0"/>
               <a:t>…</a:t>
             </a:r>
-            <a:endParaRPr lang="en-US" dirty="0" smtClean="0"/>
           </a:p>
         </p:txBody>
       </p:sp>
@@ -14297,8 +14456,8 @@
           </a:p>
         </p:txBody>
       </p:sp>
-      <mc:AlternateContent xmlns:mc="http://schemas.openxmlformats.org/markup-compatibility/2006">
-        <mc:Choice xmlns:a14="http://schemas.microsoft.com/office/drawing/2010/main" Requires="a14">
+      <mc:AlternateContent xmlns:mc="http://schemas.openxmlformats.org/markup-compatibility/2006" xmlns:a14="http://schemas.microsoft.com/office/drawing/2010/main">
+        <mc:Choice Requires="a14">
           <p:sp>
             <p:nvSpPr>
               <p:cNvPr id="3" name="Content Placeholder 2"/>
@@ -14321,11 +14480,7 @@
                 </a:pPr>
                 <a:r>
                   <a:rPr lang="en-US" dirty="0" smtClean="0"/>
-                  <a:t>3. Collision Detection</a:t>
-                </a:r>
-                <a:r>
-                  <a:rPr lang="en-US" dirty="0" smtClean="0"/>
-                  <a:t>:</a:t>
+                  <a:t>3. Collision Detection:</a:t>
                 </a:r>
               </a:p>
               <a:p>
@@ -14350,7 +14505,6 @@
                   <a:rPr lang="en-US" dirty="0" smtClean="0"/>
                   <a:t>)</a:t>
                 </a:r>
-                <a:endParaRPr lang="en-US" dirty="0" smtClean="0"/>
               </a:p>
               <a:p>
                 <a:pPr marL="457200" lvl="1" indent="0">
@@ -14401,7 +14555,7 @@
             </p:txBody>
           </p:sp>
         </mc:Choice>
-        <mc:Fallback>
+        <mc:Fallback xmlns="">
           <p:sp>
             <p:nvSpPr>
               <p:cNvPr id="3" name="Content Placeholder 2"/>
@@ -14510,11 +14664,7 @@
             </a:pPr>
             <a:r>
               <a:rPr lang="en-US" dirty="0" smtClean="0"/>
-              <a:t>4. Asking </a:t>
-            </a:r>
-            <a:r>
-              <a:rPr lang="en-US" dirty="0" smtClean="0"/>
-              <a:t>for help:</a:t>
+              <a:t>4. Asking for help:</a:t>
             </a:r>
           </a:p>
           <a:p>
@@ -14550,15 +14700,7 @@
             </a:pPr>
             <a:r>
               <a:rPr lang="en-US" dirty="0" smtClean="0"/>
-              <a:t>Ask </a:t>
-            </a:r>
-            <a:r>
-              <a:rPr lang="en-US" dirty="0" smtClean="0"/>
-              <a:t>me (seriously</a:t>
-            </a:r>
-            <a:r>
-              <a:rPr lang="en-US" dirty="0" smtClean="0"/>
-              <a:t>)!</a:t>
+              <a:t>Ask me (seriously)!</a:t>
             </a:r>
           </a:p>
           <a:p>
@@ -14804,11 +14946,7 @@
           <a:p>
             <a:r>
               <a:rPr lang="en-US" dirty="0" smtClean="0"/>
-              <a:t>Basic Physics </a:t>
-            </a:r>
-            <a:r>
-              <a:rPr lang="en-US" dirty="0" smtClean="0"/>
-              <a:t>Components</a:t>
+              <a:t>Basic Physics Components</a:t>
             </a:r>
             <a:endParaRPr lang="en-US" dirty="0"/>
           </a:p>
@@ -15102,11 +15240,7 @@
             <a:pPr lvl="1"/>
             <a:r>
               <a:rPr lang="en-US" dirty="0" smtClean="0"/>
-              <a:t>Computing Distance using </a:t>
-            </a:r>
-            <a:r>
-              <a:rPr lang="en-US" dirty="0" smtClean="0"/>
-              <a:t>GJK</a:t>
+              <a:t>Computing Distance using GJK</a:t>
             </a:r>
           </a:p>
           <a:p>
@@ -15117,7 +15251,6 @@
               <a:rPr lang="en-US" dirty="0" smtClean="0"/>
               <a:t>CS350 slides: Ask me for them?</a:t>
             </a:r>
-            <a:endParaRPr lang="en-US" dirty="0" smtClean="0"/>
           </a:p>
           <a:p>
             <a:endParaRPr lang="en-US" dirty="0"/>
@@ -15679,13 +15812,8 @@
             </a:pPr>
             <a:r>
               <a:rPr lang="en-US" dirty="0" smtClean="0"/>
-              <a:t>Material properties </a:t>
-            </a:r>
-            <a:r>
-              <a:rPr lang="en-US" dirty="0" smtClean="0"/>
-              <a:t>needed to define dynamics</a:t>
-            </a:r>
-            <a:endParaRPr lang="en-US" dirty="0" smtClean="0"/>
+              <a:t>Material properties needed to define dynamics</a:t>
+            </a:r>
           </a:p>
           <a:p>
             <a:pPr marL="0" indent="0">
@@ -17064,7 +17192,6 @@
               <a:rPr lang="en-US" dirty="0" smtClean="0"/>
               <a:t>Up to you to choose any dependencies (can be a lot to manage)</a:t>
             </a:r>
-            <a:endParaRPr lang="en-US" dirty="0" smtClean="0"/>
           </a:p>
           <a:p>
             <a:pPr lvl="1"/>

</xml_diff>

<commit_message>
Notes and updates after talking with Nate about my slides.
</commit_message>
<xml_diff>
--- a/Physics 101.pptx
+++ b/Physics 101.pptx
@@ -5,7 +5,7 @@
     <p:sldMasterId id="2147483648" r:id="rId1"/>
   </p:sldMasterIdLst>
   <p:notesMasterIdLst>
-    <p:notesMasterId r:id="rId43"/>
+    <p:notesMasterId r:id="rId44"/>
   </p:notesMasterIdLst>
   <p:sldIdLst>
     <p:sldId id="256" r:id="rId2"/>
@@ -32,23 +32,24 @@
     <p:sldId id="271" r:id="rId23"/>
     <p:sldId id="287" r:id="rId24"/>
     <p:sldId id="272" r:id="rId25"/>
-    <p:sldId id="291" r:id="rId26"/>
-    <p:sldId id="293" r:id="rId27"/>
-    <p:sldId id="292" r:id="rId28"/>
-    <p:sldId id="294" r:id="rId29"/>
-    <p:sldId id="296" r:id="rId30"/>
-    <p:sldId id="274" r:id="rId31"/>
-    <p:sldId id="288" r:id="rId32"/>
-    <p:sldId id="289" r:id="rId33"/>
-    <p:sldId id="290" r:id="rId34"/>
-    <p:sldId id="299" r:id="rId35"/>
-    <p:sldId id="275" r:id="rId36"/>
-    <p:sldId id="298" r:id="rId37"/>
-    <p:sldId id="301" r:id="rId38"/>
-    <p:sldId id="300" r:id="rId39"/>
-    <p:sldId id="297" r:id="rId40"/>
-    <p:sldId id="302" r:id="rId41"/>
-    <p:sldId id="276" r:id="rId42"/>
+    <p:sldId id="303" r:id="rId26"/>
+    <p:sldId id="291" r:id="rId27"/>
+    <p:sldId id="293" r:id="rId28"/>
+    <p:sldId id="292" r:id="rId29"/>
+    <p:sldId id="294" r:id="rId30"/>
+    <p:sldId id="296" r:id="rId31"/>
+    <p:sldId id="274" r:id="rId32"/>
+    <p:sldId id="288" r:id="rId33"/>
+    <p:sldId id="289" r:id="rId34"/>
+    <p:sldId id="290" r:id="rId35"/>
+    <p:sldId id="299" r:id="rId36"/>
+    <p:sldId id="275" r:id="rId37"/>
+    <p:sldId id="298" r:id="rId38"/>
+    <p:sldId id="301" r:id="rId39"/>
+    <p:sldId id="300" r:id="rId40"/>
+    <p:sldId id="297" r:id="rId41"/>
+    <p:sldId id="302" r:id="rId42"/>
+    <p:sldId id="276" r:id="rId43"/>
   </p:sldIdLst>
   <p:sldSz cx="12192000" cy="6858000"/>
   <p:notesSz cx="6858000" cy="9144000"/>
@@ -237,7 +238,7 @@
           <a:p>
             <a:fld id="{B0431BEA-5E23-40C3-9E68-C0C575738BB3}" type="datetimeFigureOut">
               <a:rPr lang="en-US" smtClean="0"/>
-              <a:t>7/5/2018</a:t>
+              <a:t>7/12/2018</a:t>
             </a:fld>
             <a:endParaRPr lang="en-US"/>
           </a:p>
@@ -1128,11 +1129,7 @@
             </a:r>
             <a:r>
               <a:rPr lang="en-US" b="0" baseline="0" dirty="0" smtClean="0"/>
-              <a:t>so never use it! The current industry standard (AAA games even) is to use semi-implicit Euler</a:t>
-            </a:r>
-            <a:r>
-              <a:rPr lang="en-US" b="0" baseline="0" dirty="0" smtClean="0"/>
-              <a:t>.</a:t>
+              <a:t>so never use it! The current industry standard (AAA games even) is to use semi-implicit Euler.</a:t>
             </a:r>
           </a:p>
           <a:p>
@@ -2657,7 +2654,7 @@
           <a:p>
             <a:fld id="{5A215D60-0975-47B1-AA70-33A41E16C2E3}" type="slidenum">
               <a:rPr lang="en-US" smtClean="0"/>
-              <a:t>25</a:t>
+              <a:t>26</a:t>
             </a:fld>
             <a:endParaRPr lang="en-US"/>
           </a:p>
@@ -2749,7 +2746,7 @@
           <a:p>
             <a:fld id="{5A215D60-0975-47B1-AA70-33A41E16C2E3}" type="slidenum">
               <a:rPr lang="en-US" smtClean="0"/>
-              <a:t>26</a:t>
+              <a:t>27</a:t>
             </a:fld>
             <a:endParaRPr lang="en-US"/>
           </a:p>
@@ -2875,7 +2872,7 @@
           <a:p>
             <a:fld id="{5A215D60-0975-47B1-AA70-33A41E16C2E3}" type="slidenum">
               <a:rPr lang="en-US" smtClean="0"/>
-              <a:t>27</a:t>
+              <a:t>28</a:t>
             </a:fld>
             <a:endParaRPr lang="en-US"/>
           </a:p>
@@ -3003,7 +3000,7 @@
           <a:p>
             <a:fld id="{5A215D60-0975-47B1-AA70-33A41E16C2E3}" type="slidenum">
               <a:rPr lang="en-US" smtClean="0"/>
-              <a:t>28</a:t>
+              <a:t>29</a:t>
             </a:fld>
             <a:endParaRPr lang="en-US"/>
           </a:p>
@@ -3145,7 +3142,7 @@
           <a:p>
             <a:fld id="{5A215D60-0975-47B1-AA70-33A41E16C2E3}" type="slidenum">
               <a:rPr lang="en-US" smtClean="0"/>
-              <a:t>29</a:t>
+              <a:t>30</a:t>
             </a:fld>
             <a:endParaRPr lang="en-US"/>
           </a:p>
@@ -3237,7 +3234,7 @@
           <a:p>
             <a:fld id="{5A215D60-0975-47B1-AA70-33A41E16C2E3}" type="slidenum">
               <a:rPr lang="en-US" smtClean="0"/>
-              <a:t>31</a:t>
+              <a:t>32</a:t>
             </a:fld>
             <a:endParaRPr lang="en-US"/>
           </a:p>
@@ -3463,7 +3460,7 @@
           <a:p>
             <a:fld id="{5A215D60-0975-47B1-AA70-33A41E16C2E3}" type="slidenum">
               <a:rPr lang="en-US" smtClean="0"/>
-              <a:t>32</a:t>
+              <a:t>33</a:t>
             </a:fld>
             <a:endParaRPr lang="en-US"/>
           </a:p>
@@ -3555,7 +3552,7 @@
           <a:p>
             <a:fld id="{5A215D60-0975-47B1-AA70-33A41E16C2E3}" type="slidenum">
               <a:rPr lang="en-US" smtClean="0"/>
-              <a:t>33</a:t>
+              <a:t>34</a:t>
             </a:fld>
             <a:endParaRPr lang="en-US"/>
           </a:p>
@@ -3647,7 +3644,7 @@
           <a:p>
             <a:fld id="{5A215D60-0975-47B1-AA70-33A41E16C2E3}" type="slidenum">
               <a:rPr lang="en-US" smtClean="0"/>
-              <a:t>34</a:t>
+              <a:t>35</a:t>
             </a:fld>
             <a:endParaRPr lang="en-US"/>
           </a:p>
@@ -3776,7 +3773,7 @@
           <a:p>
             <a:fld id="{5A215D60-0975-47B1-AA70-33A41E16C2E3}" type="slidenum">
               <a:rPr lang="en-US" smtClean="0"/>
-              <a:t>35</a:t>
+              <a:t>36</a:t>
             </a:fld>
             <a:endParaRPr lang="en-US"/>
           </a:p>
@@ -3868,7 +3865,7 @@
           <a:p>
             <a:fld id="{5A215D60-0975-47B1-AA70-33A41E16C2E3}" type="slidenum">
               <a:rPr lang="en-US" smtClean="0"/>
-              <a:t>36</a:t>
+              <a:t>37</a:t>
             </a:fld>
             <a:endParaRPr lang="en-US"/>
           </a:p>
@@ -3978,7 +3975,7 @@
           <a:p>
             <a:fld id="{5A215D60-0975-47B1-AA70-33A41E16C2E3}" type="slidenum">
               <a:rPr lang="en-US" smtClean="0"/>
-              <a:t>37</a:t>
+              <a:t>38</a:t>
             </a:fld>
             <a:endParaRPr lang="en-US"/>
           </a:p>
@@ -4096,7 +4093,7 @@
           <a:p>
             <a:fld id="{5A215D60-0975-47B1-AA70-33A41E16C2E3}" type="slidenum">
               <a:rPr lang="en-US" smtClean="0"/>
-              <a:t>38</a:t>
+              <a:t>39</a:t>
             </a:fld>
             <a:endParaRPr lang="en-US"/>
           </a:p>
@@ -4254,7 +4251,7 @@
           <a:p>
             <a:fld id="{5A215D60-0975-47B1-AA70-33A41E16C2E3}" type="slidenum">
               <a:rPr lang="en-US" smtClean="0"/>
-              <a:t>39</a:t>
+              <a:t>40</a:t>
             </a:fld>
             <a:endParaRPr lang="en-US"/>
           </a:p>
@@ -5275,7 +5272,7 @@
           <a:p>
             <a:fld id="{2B55C853-9142-445C-BC01-2E21383A87DA}" type="datetimeFigureOut">
               <a:rPr lang="en-US" smtClean="0"/>
-              <a:t>7/5/2018</a:t>
+              <a:t>7/12/2018</a:t>
             </a:fld>
             <a:endParaRPr lang="en-US"/>
           </a:p>
@@ -5445,7 +5442,7 @@
           <a:p>
             <a:fld id="{2B55C853-9142-445C-BC01-2E21383A87DA}" type="datetimeFigureOut">
               <a:rPr lang="en-US" smtClean="0"/>
-              <a:t>7/5/2018</a:t>
+              <a:t>7/12/2018</a:t>
             </a:fld>
             <a:endParaRPr lang="en-US"/>
           </a:p>
@@ -5625,7 +5622,7 @@
           <a:p>
             <a:fld id="{2B55C853-9142-445C-BC01-2E21383A87DA}" type="datetimeFigureOut">
               <a:rPr lang="en-US" smtClean="0"/>
-              <a:t>7/5/2018</a:t>
+              <a:t>7/12/2018</a:t>
             </a:fld>
             <a:endParaRPr lang="en-US"/>
           </a:p>
@@ -5795,7 +5792,7 @@
           <a:p>
             <a:fld id="{2B55C853-9142-445C-BC01-2E21383A87DA}" type="datetimeFigureOut">
               <a:rPr lang="en-US" smtClean="0"/>
-              <a:t>7/5/2018</a:t>
+              <a:t>7/12/2018</a:t>
             </a:fld>
             <a:endParaRPr lang="en-US"/>
           </a:p>
@@ -6041,7 +6038,7 @@
           <a:p>
             <a:fld id="{2B55C853-9142-445C-BC01-2E21383A87DA}" type="datetimeFigureOut">
               <a:rPr lang="en-US" smtClean="0"/>
-              <a:t>7/5/2018</a:t>
+              <a:t>7/12/2018</a:t>
             </a:fld>
             <a:endParaRPr lang="en-US"/>
           </a:p>
@@ -6273,7 +6270,7 @@
           <a:p>
             <a:fld id="{2B55C853-9142-445C-BC01-2E21383A87DA}" type="datetimeFigureOut">
               <a:rPr lang="en-US" smtClean="0"/>
-              <a:t>7/5/2018</a:t>
+              <a:t>7/12/2018</a:t>
             </a:fld>
             <a:endParaRPr lang="en-US"/>
           </a:p>
@@ -6640,7 +6637,7 @@
           <a:p>
             <a:fld id="{2B55C853-9142-445C-BC01-2E21383A87DA}" type="datetimeFigureOut">
               <a:rPr lang="en-US" smtClean="0"/>
-              <a:t>7/5/2018</a:t>
+              <a:t>7/12/2018</a:t>
             </a:fld>
             <a:endParaRPr lang="en-US"/>
           </a:p>
@@ -6758,7 +6755,7 @@
           <a:p>
             <a:fld id="{2B55C853-9142-445C-BC01-2E21383A87DA}" type="datetimeFigureOut">
               <a:rPr lang="en-US" smtClean="0"/>
-              <a:t>7/5/2018</a:t>
+              <a:t>7/12/2018</a:t>
             </a:fld>
             <a:endParaRPr lang="en-US"/>
           </a:p>
@@ -6853,7 +6850,7 @@
           <a:p>
             <a:fld id="{2B55C853-9142-445C-BC01-2E21383A87DA}" type="datetimeFigureOut">
               <a:rPr lang="en-US" smtClean="0"/>
-              <a:t>7/5/2018</a:t>
+              <a:t>7/12/2018</a:t>
             </a:fld>
             <a:endParaRPr lang="en-US"/>
           </a:p>
@@ -7130,7 +7127,7 @@
           <a:p>
             <a:fld id="{2B55C853-9142-445C-BC01-2E21383A87DA}" type="datetimeFigureOut">
               <a:rPr lang="en-US" smtClean="0"/>
-              <a:t>7/5/2018</a:t>
+              <a:t>7/12/2018</a:t>
             </a:fld>
             <a:endParaRPr lang="en-US"/>
           </a:p>
@@ -7383,7 +7380,7 @@
           <a:p>
             <a:fld id="{2B55C853-9142-445C-BC01-2E21383A87DA}" type="datetimeFigureOut">
               <a:rPr lang="en-US" smtClean="0"/>
-              <a:t>7/5/2018</a:t>
+              <a:t>7/12/2018</a:t>
             </a:fld>
             <a:endParaRPr lang="en-US"/>
           </a:p>
@@ -7596,7 +7593,7 @@
           <a:p>
             <a:fld id="{2B55C853-9142-445C-BC01-2E21383A87DA}" type="datetimeFigureOut">
               <a:rPr lang="en-US" smtClean="0"/>
-              <a:t>7/5/2018</a:t>
+              <a:t>7/12/2018</a:t>
             </a:fld>
             <a:endParaRPr lang="en-US"/>
           </a:p>
@@ -8656,8 +8653,8 @@
           </a:p>
         </p:txBody>
       </p:sp>
-      <mc:AlternateContent xmlns:mc="http://schemas.openxmlformats.org/markup-compatibility/2006">
-        <mc:Choice xmlns:a14="http://schemas.microsoft.com/office/drawing/2010/main" Requires="a14">
+      <mc:AlternateContent xmlns:mc="http://schemas.openxmlformats.org/markup-compatibility/2006" xmlns:a14="http://schemas.microsoft.com/office/drawing/2010/main">
+        <mc:Choice Requires="a14">
           <p:sp>
             <p:nvSpPr>
               <p:cNvPr id="3" name="Content Placeholder 2"/>
@@ -8819,7 +8816,7 @@
             </p:txBody>
           </p:sp>
         </mc:Choice>
-        <mc:Fallback>
+        <mc:Fallback xmlns="">
           <p:sp>
             <p:nvSpPr>
               <p:cNvPr id="3" name="Content Placeholder 2"/>
@@ -8905,8 +8902,8 @@
           </a:prstGeom>
         </p:spPr>
       </p:pic>
-      <mc:AlternateContent xmlns:mc="http://schemas.openxmlformats.org/markup-compatibility/2006">
-        <mc:Choice xmlns:a14="http://schemas.microsoft.com/office/drawing/2010/main" Requires="a14">
+      <mc:AlternateContent xmlns:mc="http://schemas.openxmlformats.org/markup-compatibility/2006" xmlns:a14="http://schemas.microsoft.com/office/drawing/2010/main">
+        <mc:Choice Requires="a14">
           <p:sp>
             <p:nvSpPr>
               <p:cNvPr id="8" name="Content Placeholder 2"/>
@@ -9099,11 +9096,7 @@
                 </a:pPr>
                 <a:r>
                   <a:rPr lang="en-US" dirty="0" smtClean="0"/>
-                  <a:t>Semi-implicit </a:t>
-                </a:r>
-                <a:r>
-                  <a:rPr lang="en-US" dirty="0" smtClean="0"/>
-                  <a:t>Euler</a:t>
+                  <a:t>Semi-implicit Euler</a:t>
                 </a:r>
               </a:p>
               <a:p>
@@ -9241,7 +9234,7 @@
             </p:txBody>
           </p:sp>
         </mc:Choice>
-        <mc:Fallback>
+        <mc:Fallback xmlns="">
           <p:sp>
             <p:nvSpPr>
               <p:cNvPr id="8" name="Content Placeholder 2"/>
@@ -9472,11 +9465,7 @@
             </a:pPr>
             <a:r>
               <a:rPr lang="en-US" dirty="0" smtClean="0"/>
-              <a:t>Do </a:t>
-            </a:r>
-            <a:r>
-              <a:rPr lang="en-US" dirty="0" smtClean="0"/>
-              <a:t>semi-implicit!</a:t>
+              <a:t>Do semi-implicit!</a:t>
             </a:r>
             <a:endParaRPr lang="en-US" dirty="0"/>
           </a:p>
@@ -12871,7 +12860,7 @@
           <a:p>
             <a:r>
               <a:rPr lang="en-US" dirty="0" smtClean="0"/>
-              <a:t>Recommended Implementation Order</a:t>
+              <a:t>Questions</a:t>
             </a:r>
             <a:endParaRPr lang="en-US" dirty="0"/>
           </a:p>
@@ -12889,9 +12878,7 @@
         </p:nvSpPr>
         <p:spPr/>
         <p:txBody>
-          <a:bodyPr>
-            <a:normAutofit/>
-          </a:bodyPr>
+          <a:bodyPr/>
           <a:lstStyle/>
           <a:p>
             <a:pPr marL="0" indent="0">
@@ -12899,57 +12886,7 @@
             </a:pPr>
             <a:r>
               <a:rPr lang="en-US" dirty="0" smtClean="0"/>
-              <a:t>Ignore rotation to start!</a:t>
-            </a:r>
-          </a:p>
-          <a:p>
-            <a:pPr marL="0" indent="0">
-              <a:buNone/>
-            </a:pPr>
-            <a:endParaRPr lang="en-US" dirty="0"/>
-          </a:p>
-          <a:p>
-            <a:pPr marL="0" indent="0">
-              <a:buNone/>
-            </a:pPr>
-            <a:r>
-              <a:rPr lang="en-US" dirty="0" smtClean="0"/>
-              <a:t>Basic setup:</a:t>
-            </a:r>
-          </a:p>
-          <a:p>
-            <a:pPr marL="0" indent="0">
-              <a:buNone/>
-            </a:pPr>
-            <a:r>
-              <a:rPr lang="en-US" dirty="0"/>
-              <a:t>	</a:t>
-            </a:r>
-            <a:r>
-              <a:rPr lang="en-US" dirty="0" smtClean="0"/>
-              <a:t>Setup components/properties</a:t>
-            </a:r>
-          </a:p>
-          <a:p>
-            <a:pPr marL="0" indent="0">
-              <a:buNone/>
-            </a:pPr>
-            <a:r>
-              <a:rPr lang="en-US" dirty="0"/>
-              <a:t>	</a:t>
-            </a:r>
-            <a:r>
-              <a:rPr lang="en-US" dirty="0" smtClean="0"/>
-              <a:t>Get data organized on the space</a:t>
-            </a:r>
-          </a:p>
-          <a:p>
-            <a:pPr marL="0" indent="0">
-              <a:buNone/>
-            </a:pPr>
-            <a:r>
-              <a:rPr lang="en-US" dirty="0" smtClean="0"/>
-              <a:t>	Stub 4 main phases</a:t>
+              <a:t>Any questions so far?</a:t>
             </a:r>
             <a:endParaRPr lang="en-US" dirty="0"/>
           </a:p>
@@ -12958,7 +12895,7 @@
     </p:spTree>
     <p:extLst>
       <p:ext uri="{BB962C8B-B14F-4D97-AF65-F5344CB8AC3E}">
-        <p14:creationId xmlns:p14="http://schemas.microsoft.com/office/powerpoint/2010/main" val="1196246830"/>
+        <p14:creationId xmlns:p14="http://schemas.microsoft.com/office/powerpoint/2010/main" val="3350944352"/>
       </p:ext>
     </p:extLst>
   </p:cSld>
@@ -13030,25 +12967,57 @@
             </a:pPr>
             <a:r>
               <a:rPr lang="en-US" dirty="0" smtClean="0"/>
-              <a:t>Integration:</a:t>
-            </a:r>
-          </a:p>
-          <a:p>
-            <a:pPr marL="457200" lvl="1" indent="0">
-              <a:buNone/>
-            </a:pPr>
-            <a:r>
-              <a:rPr lang="en-US" dirty="0" smtClean="0"/>
-              <a:t>Apply basic forces to get objects moving</a:t>
-            </a:r>
-          </a:p>
-          <a:p>
-            <a:pPr marL="457200" lvl="1" indent="0">
-              <a:buNone/>
-            </a:pPr>
-            <a:r>
-              <a:rPr lang="en-US" dirty="0" smtClean="0"/>
-              <a:t>Requires transferring data back to the engine</a:t>
+              <a:t>Ignore rotation to start!</a:t>
+            </a:r>
+          </a:p>
+          <a:p>
+            <a:pPr marL="0" indent="0">
+              <a:buNone/>
+            </a:pPr>
+            <a:endParaRPr lang="en-US" dirty="0"/>
+          </a:p>
+          <a:p>
+            <a:pPr marL="0" indent="0">
+              <a:buNone/>
+            </a:pPr>
+            <a:r>
+              <a:rPr lang="en-US" dirty="0" smtClean="0"/>
+              <a:t>Basic setup:</a:t>
+            </a:r>
+          </a:p>
+          <a:p>
+            <a:pPr marL="0" indent="0">
+              <a:buNone/>
+            </a:pPr>
+            <a:r>
+              <a:rPr lang="en-US" dirty="0"/>
+              <a:t>	</a:t>
+            </a:r>
+            <a:r>
+              <a:rPr lang="en-US" dirty="0" smtClean="0"/>
+              <a:t>Setup components/properties</a:t>
+            </a:r>
+          </a:p>
+          <a:p>
+            <a:pPr marL="0" indent="0">
+              <a:buNone/>
+            </a:pPr>
+            <a:r>
+              <a:rPr lang="en-US" dirty="0"/>
+              <a:t>	</a:t>
+            </a:r>
+            <a:r>
+              <a:rPr lang="en-US" dirty="0" smtClean="0"/>
+              <a:t>Get data organized on the space</a:t>
+            </a:r>
+          </a:p>
+          <a:p>
+            <a:pPr marL="0" indent="0">
+              <a:buNone/>
+            </a:pPr>
+            <a:r>
+              <a:rPr lang="en-US" dirty="0" smtClean="0"/>
+              <a:t>	Stub 4 main phases</a:t>
             </a:r>
             <a:endParaRPr lang="en-US" dirty="0"/>
           </a:p>
@@ -13057,7 +13026,7 @@
     </p:spTree>
     <p:extLst>
       <p:ext uri="{BB962C8B-B14F-4D97-AF65-F5344CB8AC3E}">
-        <p14:creationId xmlns:p14="http://schemas.microsoft.com/office/powerpoint/2010/main" val="3508637059"/>
+        <p14:creationId xmlns:p14="http://schemas.microsoft.com/office/powerpoint/2010/main" val="1196246830"/>
       </p:ext>
     </p:extLst>
   </p:cSld>
@@ -13129,75 +13098,25 @@
             </a:pPr>
             <a:r>
               <a:rPr lang="en-US" dirty="0" smtClean="0"/>
-              <a:t>Collision detection:</a:t>
-            </a:r>
-          </a:p>
-          <a:p>
-            <a:pPr marL="914400" lvl="1" indent="-457200">
-              <a:buFont typeface="+mj-lt"/>
-              <a:buAutoNum type="arabicPeriod"/>
-            </a:pPr>
-            <a:r>
-              <a:rPr lang="en-US" dirty="0" smtClean="0"/>
-              <a:t>Stub </a:t>
-            </a:r>
-            <a:r>
-              <a:rPr lang="en-US" dirty="0" err="1" smtClean="0"/>
-              <a:t>BroadPhase</a:t>
-            </a:r>
-            <a:r>
-              <a:rPr lang="en-US" dirty="0" smtClean="0"/>
-              <a:t> (N-Squared)</a:t>
-            </a:r>
-          </a:p>
-          <a:p>
-            <a:pPr marL="914400" lvl="1" indent="-457200">
-              <a:buFont typeface="+mj-lt"/>
-              <a:buAutoNum type="arabicPeriod"/>
-            </a:pPr>
-            <a:r>
-              <a:rPr lang="en-US" dirty="0" smtClean="0"/>
-              <a:t>Simple </a:t>
-            </a:r>
-            <a:r>
-              <a:rPr lang="en-US" dirty="0" err="1" smtClean="0"/>
-              <a:t>NarrowPhase</a:t>
-            </a:r>
-            <a:endParaRPr lang="en-US" dirty="0" smtClean="0"/>
-          </a:p>
-          <a:p>
-            <a:pPr lvl="2"/>
-            <a:r>
-              <a:rPr lang="en-US" dirty="0" smtClean="0"/>
-              <a:t>Spheres and boxes</a:t>
-            </a:r>
-          </a:p>
-          <a:p>
-            <a:pPr lvl="1"/>
-            <a:endParaRPr lang="en-US" dirty="0" smtClean="0"/>
-          </a:p>
-          <a:p>
-            <a:pPr marL="0" indent="0">
-              <a:buNone/>
-            </a:pPr>
-            <a:endParaRPr lang="en-US" dirty="0" smtClean="0"/>
-          </a:p>
-          <a:p>
-            <a:pPr marL="0" indent="0">
-              <a:buNone/>
-            </a:pPr>
-            <a:r>
-              <a:rPr lang="en-US" dirty="0" smtClean="0"/>
-              <a:t>Debug draw results</a:t>
-            </a:r>
-          </a:p>
-          <a:p>
-            <a:pPr marL="0" indent="0">
-              <a:buNone/>
-            </a:pPr>
-            <a:r>
-              <a:rPr lang="en-US" dirty="0" smtClean="0"/>
-              <a:t>Only need normal and penetration to start</a:t>
+              <a:t>Integration:</a:t>
+            </a:r>
+          </a:p>
+          <a:p>
+            <a:pPr marL="457200" lvl="1" indent="0">
+              <a:buNone/>
+            </a:pPr>
+            <a:r>
+              <a:rPr lang="en-US" dirty="0" smtClean="0"/>
+              <a:t>Apply basic forces to get objects moving</a:t>
+            </a:r>
+          </a:p>
+          <a:p>
+            <a:pPr marL="457200" lvl="1" indent="0">
+              <a:buNone/>
+            </a:pPr>
+            <a:r>
+              <a:rPr lang="en-US" dirty="0" smtClean="0"/>
+              <a:t>Requires transferring data back to the engine</a:t>
             </a:r>
             <a:endParaRPr lang="en-US" dirty="0"/>
           </a:p>
@@ -13206,7 +13125,7 @@
     </p:spTree>
     <p:extLst>
       <p:ext uri="{BB962C8B-B14F-4D97-AF65-F5344CB8AC3E}">
-        <p14:creationId xmlns:p14="http://schemas.microsoft.com/office/powerpoint/2010/main" val="3940680577"/>
+        <p14:creationId xmlns:p14="http://schemas.microsoft.com/office/powerpoint/2010/main" val="3508637059"/>
       </p:ext>
     </p:extLst>
   </p:cSld>
@@ -13278,26 +13197,58 @@
             </a:pPr>
             <a:r>
               <a:rPr lang="en-US" dirty="0" smtClean="0"/>
-              <a:t>Resolution:</a:t>
-            </a:r>
+              <a:t>Collision detection:</a:t>
+            </a:r>
+          </a:p>
+          <a:p>
+            <a:pPr marL="914400" lvl="1" indent="-457200">
+              <a:buFont typeface="+mj-lt"/>
+              <a:buAutoNum type="arabicPeriod"/>
+            </a:pPr>
+            <a:r>
+              <a:rPr lang="en-US" dirty="0" smtClean="0"/>
+              <a:t>Stub </a:t>
+            </a:r>
+            <a:r>
+              <a:rPr lang="en-US" dirty="0" err="1" smtClean="0"/>
+              <a:t>BroadPhase</a:t>
+            </a:r>
+            <a:r>
+              <a:rPr lang="en-US" dirty="0" smtClean="0"/>
+              <a:t> (N-Squared)</a:t>
+            </a:r>
+          </a:p>
+          <a:p>
+            <a:pPr marL="914400" lvl="1" indent="-457200">
+              <a:buFont typeface="+mj-lt"/>
+              <a:buAutoNum type="arabicPeriod"/>
+            </a:pPr>
+            <a:r>
+              <a:rPr lang="en-US" dirty="0" smtClean="0"/>
+              <a:t>Simple </a:t>
+            </a:r>
+            <a:r>
+              <a:rPr lang="en-US" dirty="0" err="1" smtClean="0"/>
+              <a:t>NarrowPhase</a:t>
+            </a:r>
+            <a:endParaRPr lang="en-US" dirty="0" smtClean="0"/>
+          </a:p>
+          <a:p>
+            <a:pPr lvl="2"/>
+            <a:r>
+              <a:rPr lang="en-US" dirty="0" smtClean="0"/>
+              <a:t>Spheres and boxes</a:t>
+            </a:r>
+          </a:p>
+          <a:p>
+            <a:pPr lvl="1"/>
+            <a:endParaRPr lang="en-US" dirty="0" smtClean="0"/>
           </a:p>
           <a:p>
             <a:pPr marL="0" indent="0">
               <a:buNone/>
             </a:pPr>
-            <a:r>
-              <a:rPr lang="en-US" dirty="0" smtClean="0"/>
-              <a:t>Start with spheres hitting without gravity</a:t>
-            </a:r>
-          </a:p>
-          <a:p>
-            <a:pPr marL="457200" lvl="1" indent="0">
-              <a:buNone/>
-            </a:pPr>
-            <a:r>
-              <a:rPr lang="en-US" dirty="0" smtClean="0"/>
-              <a:t>Tests basic resolution, restitution, and mass</a:t>
-            </a:r>
+            <a:endParaRPr lang="en-US" dirty="0" smtClean="0"/>
           </a:p>
           <a:p>
             <a:pPr marL="0" indent="0">
@@ -13305,41 +13256,16 @@
             </a:pPr>
             <a:r>
               <a:rPr lang="en-US" dirty="0" smtClean="0"/>
-              <a:t>Move onto sphere resting on static box</a:t>
-            </a:r>
-          </a:p>
-          <a:p>
-            <a:pPr marL="457200" lvl="1" indent="0">
-              <a:buNone/>
-            </a:pPr>
-            <a:r>
-              <a:rPr lang="en-US" dirty="0" smtClean="0"/>
-              <a:t>Requires penetration resolution</a:t>
+              <a:t>Debug draw results</a:t>
             </a:r>
           </a:p>
           <a:p>
             <a:pPr marL="0" indent="0">
               <a:buNone/>
             </a:pPr>
-            <a:endParaRPr lang="en-US" dirty="0" smtClean="0"/>
-          </a:p>
-          <a:p>
-            <a:pPr marL="0" indent="0">
-              <a:buNone/>
-            </a:pPr>
-            <a:r>
-              <a:rPr lang="en-US" dirty="0" smtClean="0"/>
-              <a:t>Add friction</a:t>
-            </a:r>
-            <a:endParaRPr lang="en-US" dirty="0"/>
-          </a:p>
-          <a:p>
-            <a:pPr marL="457200" lvl="1" indent="0">
-              <a:buNone/>
-            </a:pPr>
-            <a:r>
-              <a:rPr lang="en-US" dirty="0" smtClean="0"/>
-              <a:t>*Never do rotation before friction</a:t>
+            <a:r>
+              <a:rPr lang="en-US" dirty="0" smtClean="0"/>
+              <a:t>Only need normal and penetration to start</a:t>
             </a:r>
             <a:endParaRPr lang="en-US" dirty="0"/>
           </a:p>
@@ -13348,7 +13274,7 @@
     </p:spTree>
     <p:extLst>
       <p:ext uri="{BB962C8B-B14F-4D97-AF65-F5344CB8AC3E}">
-        <p14:creationId xmlns:p14="http://schemas.microsoft.com/office/powerpoint/2010/main" val="2967544397"/>
+        <p14:creationId xmlns:p14="http://schemas.microsoft.com/office/powerpoint/2010/main" val="3940680577"/>
       </p:ext>
     </p:extLst>
   </p:cSld>
@@ -13420,7 +13346,16 @@
             </a:pPr>
             <a:r>
               <a:rPr lang="en-US" dirty="0" smtClean="0"/>
-              <a:t>Remaining basic functionality:</a:t>
+              <a:t>Resolution:</a:t>
+            </a:r>
+          </a:p>
+          <a:p>
+            <a:pPr marL="0" indent="0">
+              <a:buNone/>
+            </a:pPr>
+            <a:r>
+              <a:rPr lang="en-US" dirty="0" smtClean="0"/>
+              <a:t>Start with spheres hitting without gravity</a:t>
             </a:r>
           </a:p>
           <a:p>
@@ -13429,7 +13364,16 @@
             </a:pPr>
             <a:r>
               <a:rPr lang="en-US" dirty="0" smtClean="0"/>
-              <a:t>Events</a:t>
+              <a:t>Tests basic resolution, restitution, and mass</a:t>
+            </a:r>
+          </a:p>
+          <a:p>
+            <a:pPr marL="0" indent="0">
+              <a:buNone/>
+            </a:pPr>
+            <a:r>
+              <a:rPr lang="en-US" dirty="0" smtClean="0"/>
+              <a:t>Move onto sphere resting on static box</a:t>
             </a:r>
           </a:p>
           <a:p>
@@ -13438,27 +13382,32 @@
             </a:pPr>
             <a:r>
               <a:rPr lang="en-US" dirty="0" smtClean="0"/>
-              <a:t>Query functions (</a:t>
-            </a:r>
-            <a:r>
-              <a:rPr lang="en-US" dirty="0" err="1" smtClean="0"/>
-              <a:t>raycasting</a:t>
-            </a:r>
-            <a:r>
-              <a:rPr lang="en-US" dirty="0" smtClean="0"/>
-              <a:t>)</a:t>
-            </a:r>
-          </a:p>
-          <a:p>
+              <a:t>Requires penetration resolution</a:t>
+            </a:r>
+          </a:p>
+          <a:p>
+            <a:pPr marL="0" indent="0">
+              <a:buNone/>
+            </a:pPr>
+            <a:endParaRPr lang="en-US" dirty="0" smtClean="0"/>
+          </a:p>
+          <a:p>
+            <a:pPr marL="0" indent="0">
+              <a:buNone/>
+            </a:pPr>
+            <a:r>
+              <a:rPr lang="en-US" dirty="0" smtClean="0"/>
+              <a:t>Add friction</a:t>
+            </a:r>
             <a:endParaRPr lang="en-US" dirty="0"/>
           </a:p>
           <a:p>
-            <a:pPr marL="0" indent="0">
-              <a:buNone/>
-            </a:pPr>
-            <a:r>
-              <a:rPr lang="en-US" dirty="0" smtClean="0"/>
-              <a:t>Now you can do rotation (basically same order as before)</a:t>
+            <a:pPr marL="457200" lvl="1" indent="0">
+              <a:buNone/>
+            </a:pPr>
+            <a:r>
+              <a:rPr lang="en-US" dirty="0" smtClean="0"/>
+              <a:t>*Never do rotation before friction</a:t>
             </a:r>
             <a:endParaRPr lang="en-US" dirty="0"/>
           </a:p>
@@ -13467,7 +13416,7 @@
     </p:spTree>
     <p:extLst>
       <p:ext uri="{BB962C8B-B14F-4D97-AF65-F5344CB8AC3E}">
-        <p14:creationId xmlns:p14="http://schemas.microsoft.com/office/powerpoint/2010/main" val="3753680541"/>
+        <p14:creationId xmlns:p14="http://schemas.microsoft.com/office/powerpoint/2010/main" val="2967544397"/>
       </p:ext>
     </p:extLst>
   </p:cSld>
@@ -13594,6 +13543,125 @@
           <a:p>
             <a:r>
               <a:rPr lang="en-US" dirty="0" smtClean="0"/>
+              <a:t>Recommended Implementation Order</a:t>
+            </a:r>
+            <a:endParaRPr lang="en-US" dirty="0"/>
+          </a:p>
+        </p:txBody>
+      </p:sp>
+      <p:sp>
+        <p:nvSpPr>
+          <p:cNvPr id="3" name="Content Placeholder 2"/>
+          <p:cNvSpPr>
+            <a:spLocks noGrp="1"/>
+          </p:cNvSpPr>
+          <p:nvPr>
+            <p:ph idx="1"/>
+          </p:nvPr>
+        </p:nvSpPr>
+        <p:spPr/>
+        <p:txBody>
+          <a:bodyPr>
+            <a:normAutofit/>
+          </a:bodyPr>
+          <a:lstStyle/>
+          <a:p>
+            <a:pPr marL="0" indent="0">
+              <a:buNone/>
+            </a:pPr>
+            <a:r>
+              <a:rPr lang="en-US" dirty="0" smtClean="0"/>
+              <a:t>Remaining basic functionality:</a:t>
+            </a:r>
+          </a:p>
+          <a:p>
+            <a:pPr marL="457200" lvl="1" indent="0">
+              <a:buNone/>
+            </a:pPr>
+            <a:r>
+              <a:rPr lang="en-US" dirty="0" smtClean="0"/>
+              <a:t>Events</a:t>
+            </a:r>
+          </a:p>
+          <a:p>
+            <a:pPr marL="457200" lvl="1" indent="0">
+              <a:buNone/>
+            </a:pPr>
+            <a:r>
+              <a:rPr lang="en-US" dirty="0" smtClean="0"/>
+              <a:t>Query functions (</a:t>
+            </a:r>
+            <a:r>
+              <a:rPr lang="en-US" dirty="0" err="1" smtClean="0"/>
+              <a:t>raycasting</a:t>
+            </a:r>
+            <a:r>
+              <a:rPr lang="en-US" dirty="0" smtClean="0"/>
+              <a:t>)</a:t>
+            </a:r>
+          </a:p>
+          <a:p>
+            <a:endParaRPr lang="en-US" dirty="0"/>
+          </a:p>
+          <a:p>
+            <a:pPr marL="0" indent="0">
+              <a:buNone/>
+            </a:pPr>
+            <a:r>
+              <a:rPr lang="en-US" dirty="0" smtClean="0"/>
+              <a:t>Now you can do rotation (basically same order as before)</a:t>
+            </a:r>
+            <a:endParaRPr lang="en-US" dirty="0"/>
+          </a:p>
+        </p:txBody>
+      </p:sp>
+    </p:spTree>
+    <p:extLst>
+      <p:ext uri="{BB962C8B-B14F-4D97-AF65-F5344CB8AC3E}">
+        <p14:creationId xmlns:p14="http://schemas.microsoft.com/office/powerpoint/2010/main" val="3753680541"/>
+      </p:ext>
+    </p:extLst>
+  </p:cSld>
+  <p:clrMapOvr>
+    <a:masterClrMapping/>
+  </p:clrMapOvr>
+</p:sld>
+</file>
+
+<file path=ppt/slides/slide31.xml><?xml version="1.0" encoding="utf-8"?>
+<p:sld xmlns:a="http://schemas.openxmlformats.org/drawingml/2006/main" xmlns:r="http://schemas.openxmlformats.org/officeDocument/2006/relationships" xmlns:p="http://schemas.openxmlformats.org/presentationml/2006/main">
+  <p:cSld>
+    <p:spTree>
+      <p:nvGrpSpPr>
+        <p:cNvPr id="1" name=""/>
+        <p:cNvGrpSpPr/>
+        <p:nvPr/>
+      </p:nvGrpSpPr>
+      <p:grpSpPr>
+        <a:xfrm>
+          <a:off x="0" y="0"/>
+          <a:ext cx="0" cy="0"/>
+          <a:chOff x="0" y="0"/>
+          <a:chExt cx="0" cy="0"/>
+        </a:xfrm>
+      </p:grpSpPr>
+      <p:sp>
+        <p:nvSpPr>
+          <p:cNvPr id="2" name="Title 1"/>
+          <p:cNvSpPr>
+            <a:spLocks noGrp="1"/>
+          </p:cNvSpPr>
+          <p:nvPr>
+            <p:ph type="title"/>
+          </p:nvPr>
+        </p:nvSpPr>
+        <p:spPr/>
+        <p:txBody>
+          <a:bodyPr/>
+          <a:lstStyle/>
+          <a:p>
+            <a:r>
+              <a:rPr lang="en-US" dirty="0" smtClean="0"/>
               <a:t>Debugging</a:t>
             </a:r>
             <a:endParaRPr lang="en-US" dirty="0"/>
@@ -13696,7 +13764,7 @@
 </p:sld>
 </file>
 
-<file path=ppt/slides/slide31.xml><?xml version="1.0" encoding="utf-8"?>
+<file path=ppt/slides/slide32.xml><?xml version="1.0" encoding="utf-8"?>
 <p:sld xmlns:a="http://schemas.openxmlformats.org/drawingml/2006/main" xmlns:r="http://schemas.openxmlformats.org/officeDocument/2006/relationships" xmlns:p="http://schemas.openxmlformats.org/presentationml/2006/main">
   <p:cSld>
     <p:spTree>
@@ -13847,102 +13915,6 @@
 </p:sld>
 </file>
 
-<file path=ppt/slides/slide32.xml><?xml version="1.0" encoding="utf-8"?>
-<p:sld xmlns:a="http://schemas.openxmlformats.org/drawingml/2006/main" xmlns:r="http://schemas.openxmlformats.org/officeDocument/2006/relationships" xmlns:p="http://schemas.openxmlformats.org/presentationml/2006/main">
-  <p:cSld>
-    <p:spTree>
-      <p:nvGrpSpPr>
-        <p:cNvPr id="1" name=""/>
-        <p:cNvGrpSpPr/>
-        <p:nvPr/>
-      </p:nvGrpSpPr>
-      <p:grpSpPr>
-        <a:xfrm>
-          <a:off x="0" y="0"/>
-          <a:ext cx="0" cy="0"/>
-          <a:chOff x="0" y="0"/>
-          <a:chExt cx="0" cy="0"/>
-        </a:xfrm>
-      </p:grpSpPr>
-      <p:sp>
-        <p:nvSpPr>
-          <p:cNvPr id="2" name="Title 1"/>
-          <p:cNvSpPr>
-            <a:spLocks noGrp="1"/>
-          </p:cNvSpPr>
-          <p:nvPr>
-            <p:ph type="title"/>
-          </p:nvPr>
-        </p:nvSpPr>
-        <p:spPr/>
-        <p:txBody>
-          <a:bodyPr/>
-          <a:lstStyle/>
-          <a:p>
-            <a:r>
-              <a:rPr lang="en-US" dirty="0" smtClean="0"/>
-              <a:t>Determinism</a:t>
-            </a:r>
-            <a:endParaRPr lang="en-US" dirty="0"/>
-          </a:p>
-        </p:txBody>
-      </p:sp>
-      <p:sp>
-        <p:nvSpPr>
-          <p:cNvPr id="3" name="Content Placeholder 2"/>
-          <p:cNvSpPr>
-            <a:spLocks noGrp="1"/>
-          </p:cNvSpPr>
-          <p:nvPr>
-            <p:ph idx="1"/>
-          </p:nvPr>
-        </p:nvSpPr>
-        <p:spPr/>
-        <p:txBody>
-          <a:bodyPr/>
-          <a:lstStyle/>
-          <a:p>
-            <a:pPr marL="0" indent="0">
-              <a:buNone/>
-            </a:pPr>
-            <a:r>
-              <a:rPr lang="en-US" dirty="0" smtClean="0"/>
-              <a:t>Hard to fix something you can’t reproduce</a:t>
-            </a:r>
-          </a:p>
-          <a:p>
-            <a:pPr marL="0" indent="0">
-              <a:buNone/>
-            </a:pPr>
-            <a:r>
-              <a:rPr lang="en-US" dirty="0" smtClean="0"/>
-              <a:t>Fix your </a:t>
-            </a:r>
-            <a:r>
-              <a:rPr lang="en-US" dirty="0" err="1" smtClean="0"/>
-              <a:t>timestep</a:t>
-            </a:r>
-            <a:r>
-              <a:rPr lang="en-US" dirty="0" smtClean="0"/>
-              <a:t> (just hardcode to 1/60)</a:t>
-            </a:r>
-            <a:endParaRPr lang="en-US" dirty="0"/>
-          </a:p>
-        </p:txBody>
-      </p:sp>
-    </p:spTree>
-    <p:extLst>
-      <p:ext uri="{BB962C8B-B14F-4D97-AF65-F5344CB8AC3E}">
-        <p14:creationId xmlns:p14="http://schemas.microsoft.com/office/powerpoint/2010/main" val="3033313317"/>
-      </p:ext>
-    </p:extLst>
-  </p:cSld>
-  <p:clrMapOvr>
-    <a:masterClrMapping/>
-  </p:clrMapOvr>
-</p:sld>
-</file>
-
 <file path=ppt/slides/slide33.xml><?xml version="1.0" encoding="utf-8"?>
 <p:sld xmlns:a="http://schemas.openxmlformats.org/drawingml/2006/main" xmlns:r="http://schemas.openxmlformats.org/officeDocument/2006/relationships" xmlns:p="http://schemas.openxmlformats.org/presentationml/2006/main">
   <p:cSld>
@@ -13977,7 +13949,7 @@
           <a:p>
             <a:r>
               <a:rPr lang="en-US" dirty="0" smtClean="0"/>
-              <a:t>Pause/Step/Continue</a:t>
+              <a:t>Determinism</a:t>
             </a:r>
             <a:endParaRPr lang="en-US" dirty="0"/>
           </a:p>
@@ -14003,7 +13975,7 @@
             </a:pPr>
             <a:r>
               <a:rPr lang="en-US" dirty="0" smtClean="0"/>
-              <a:t>If you’re deterministic bugs will happen on the same frame</a:t>
+              <a:t>Hard to fix something you can’t reproduce</a:t>
             </a:r>
           </a:p>
           <a:p>
@@ -14012,7 +13984,15 @@
             </a:pPr>
             <a:r>
               <a:rPr lang="en-US" dirty="0" smtClean="0"/>
-              <a:t>Make it so you can get to a frame and look around at debug drawing in the scene</a:t>
+              <a:t>Fix your </a:t>
+            </a:r>
+            <a:r>
+              <a:rPr lang="en-US" dirty="0" err="1" smtClean="0"/>
+              <a:t>timestep</a:t>
+            </a:r>
+            <a:r>
+              <a:rPr lang="en-US" dirty="0" smtClean="0"/>
+              <a:t> (just hardcode to 1/60)</a:t>
             </a:r>
             <a:endParaRPr lang="en-US" dirty="0"/>
           </a:p>
@@ -14021,7 +14001,7 @@
     </p:spTree>
     <p:extLst>
       <p:ext uri="{BB962C8B-B14F-4D97-AF65-F5344CB8AC3E}">
-        <p14:creationId xmlns:p14="http://schemas.microsoft.com/office/powerpoint/2010/main" val="1287214644"/>
+        <p14:creationId xmlns:p14="http://schemas.microsoft.com/office/powerpoint/2010/main" val="3033313317"/>
       </p:ext>
     </p:extLst>
   </p:cSld>
@@ -14065,7 +14045,7 @@
           <a:p>
             <a:r>
               <a:rPr lang="en-US" dirty="0" smtClean="0"/>
-              <a:t>Common Pitfalls</a:t>
+              <a:t>Pause/Step/Continue</a:t>
             </a:r>
             <a:endParaRPr lang="en-US" dirty="0"/>
           </a:p>
@@ -14083,60 +14063,24 @@
         </p:nvSpPr>
         <p:spPr/>
         <p:txBody>
-          <a:bodyPr>
-            <a:normAutofit/>
-          </a:bodyPr>
-          <a:lstStyle/>
-          <a:p>
-            <a:pPr marL="514350" indent="-514350">
-              <a:buFont typeface="+mj-lt"/>
-              <a:buAutoNum type="arabicPeriod"/>
-            </a:pPr>
-            <a:r>
-              <a:rPr lang="en-US" dirty="0"/>
-              <a:t>Minus </a:t>
-            </a:r>
-            <a:r>
-              <a:rPr lang="en-US" dirty="0" smtClean="0"/>
-              <a:t>signs</a:t>
-            </a:r>
-          </a:p>
-          <a:p>
-            <a:pPr marL="514350" indent="-514350">
-              <a:buFont typeface="+mj-lt"/>
-              <a:buAutoNum type="arabicPeriod"/>
-            </a:pPr>
-            <a:r>
-              <a:rPr lang="en-US" dirty="0" smtClean="0"/>
-              <a:t>Space of operation</a:t>
-            </a:r>
-          </a:p>
-          <a:p>
-            <a:pPr marL="514350" indent="-514350">
-              <a:buFont typeface="+mj-lt"/>
-              <a:buAutoNum type="arabicPeriod"/>
-            </a:pPr>
-            <a:r>
-              <a:rPr lang="en-US" dirty="0" smtClean="0"/>
-              <a:t>Collision Detection</a:t>
-            </a:r>
-          </a:p>
-          <a:p>
-            <a:pPr marL="514350" indent="-514350">
-              <a:buFont typeface="+mj-lt"/>
-              <a:buAutoNum type="arabicPeriod"/>
-            </a:pPr>
-            <a:r>
-              <a:rPr lang="en-US" dirty="0" smtClean="0"/>
-              <a:t>Asking </a:t>
-            </a:r>
-            <a:r>
-              <a:rPr lang="en-US" dirty="0"/>
-              <a:t>for </a:t>
-            </a:r>
-            <a:r>
-              <a:rPr lang="en-US" dirty="0" smtClean="0"/>
-              <a:t>help</a:t>
+          <a:bodyPr/>
+          <a:lstStyle/>
+          <a:p>
+            <a:pPr marL="0" indent="0">
+              <a:buNone/>
+            </a:pPr>
+            <a:r>
+              <a:rPr lang="en-US" dirty="0" smtClean="0"/>
+              <a:t>If you’re deterministic bugs will happen on the same frame</a:t>
+            </a:r>
+          </a:p>
+          <a:p>
+            <a:pPr marL="0" indent="0">
+              <a:buNone/>
+            </a:pPr>
+            <a:r>
+              <a:rPr lang="en-US" dirty="0" smtClean="0"/>
+              <a:t>Make it so you can get to a frame and look around at debug drawing in the scene</a:t>
             </a:r>
             <a:endParaRPr lang="en-US" dirty="0"/>
           </a:p>
@@ -14145,7 +14089,7 @@
     </p:spTree>
     <p:extLst>
       <p:ext uri="{BB962C8B-B14F-4D97-AF65-F5344CB8AC3E}">
-        <p14:creationId xmlns:p14="http://schemas.microsoft.com/office/powerpoint/2010/main" val="739446331"/>
+        <p14:creationId xmlns:p14="http://schemas.microsoft.com/office/powerpoint/2010/main" val="1287214644"/>
       </p:ext>
     </p:extLst>
   </p:cSld>
@@ -14212,69 +14156,64 @@
           </a:bodyPr>
           <a:lstStyle/>
           <a:p>
-            <a:pPr marL="0" indent="0">
-              <a:buNone/>
-            </a:pPr>
-            <a:r>
-              <a:rPr lang="en-US" dirty="0" smtClean="0"/>
-              <a:t>1. Minus signs:</a:t>
-            </a:r>
-          </a:p>
-          <a:p>
-            <a:pPr marL="457200" lvl="1" indent="0">
-              <a:buNone/>
-            </a:pPr>
-            <a:r>
-              <a:rPr lang="en-US" dirty="0" smtClean="0"/>
-              <a:t>They’re everywhere and come in pairs</a:t>
-            </a:r>
-          </a:p>
-          <a:p>
-            <a:pPr marL="457200" lvl="1" indent="0">
-              <a:buNone/>
-            </a:pPr>
-            <a:r>
-              <a:rPr lang="en-US" dirty="0" smtClean="0"/>
-              <a:t>Fixing one can make things look worse (when it’s more correct)</a:t>
-            </a:r>
-          </a:p>
-          <a:p>
-            <a:pPr marL="914400" lvl="2" indent="0">
-              <a:buNone/>
-            </a:pPr>
-            <a:r>
-              <a:rPr lang="en-US" dirty="0" smtClean="0"/>
-              <a:t>Contact point vs. penetration distance example</a:t>
-            </a:r>
-          </a:p>
-          <a:p>
-            <a:pPr marL="457200" lvl="1" indent="0">
-              <a:buNone/>
-            </a:pPr>
-            <a:r>
-              <a:rPr lang="en-US" dirty="0" smtClean="0"/>
-              <a:t>Intersection: consistent normal direction</a:t>
-            </a:r>
-          </a:p>
-          <a:p>
-            <a:pPr marL="457200" lvl="1" indent="0">
-              <a:buNone/>
+            <a:pPr marL="514350" indent="-514350">
+              <a:buFont typeface="+mj-lt"/>
+              <a:buAutoNum type="arabicPeriod"/>
             </a:pPr>
             <a:r>
               <a:rPr lang="en-US" dirty="0"/>
-              <a:t>Can be more subtle (matrix multiplication order)</a:t>
-            </a:r>
-          </a:p>
-          <a:p>
-            <a:pPr lvl="1"/>
-            <a:endParaRPr lang="en-US" dirty="0" smtClean="0"/>
+              <a:t>Minus </a:t>
+            </a:r>
+            <a:r>
+              <a:rPr lang="en-US" dirty="0" smtClean="0"/>
+              <a:t>signs</a:t>
+            </a:r>
+          </a:p>
+          <a:p>
+            <a:pPr marL="514350" indent="-514350">
+              <a:buFont typeface="+mj-lt"/>
+              <a:buAutoNum type="arabicPeriod"/>
+            </a:pPr>
+            <a:r>
+              <a:rPr lang="en-US" dirty="0" smtClean="0"/>
+              <a:t>Space of operation</a:t>
+            </a:r>
+          </a:p>
+          <a:p>
+            <a:pPr marL="514350" indent="-514350">
+              <a:buFont typeface="+mj-lt"/>
+              <a:buAutoNum type="arabicPeriod"/>
+            </a:pPr>
+            <a:r>
+              <a:rPr lang="en-US" dirty="0" smtClean="0"/>
+              <a:t>Collision Detection</a:t>
+            </a:r>
+          </a:p>
+          <a:p>
+            <a:pPr marL="514350" indent="-514350">
+              <a:buFont typeface="+mj-lt"/>
+              <a:buAutoNum type="arabicPeriod"/>
+            </a:pPr>
+            <a:r>
+              <a:rPr lang="en-US" dirty="0" smtClean="0"/>
+              <a:t>Asking </a:t>
+            </a:r>
+            <a:r>
+              <a:rPr lang="en-US" dirty="0"/>
+              <a:t>for </a:t>
+            </a:r>
+            <a:r>
+              <a:rPr lang="en-US" dirty="0" smtClean="0"/>
+              <a:t>help</a:t>
+            </a:r>
+            <a:endParaRPr lang="en-US" dirty="0"/>
           </a:p>
         </p:txBody>
       </p:sp>
     </p:spTree>
     <p:extLst>
       <p:ext uri="{BB962C8B-B14F-4D97-AF65-F5344CB8AC3E}">
-        <p14:creationId xmlns:p14="http://schemas.microsoft.com/office/powerpoint/2010/main" val="3227015425"/>
+        <p14:creationId xmlns:p14="http://schemas.microsoft.com/office/powerpoint/2010/main" val="739446331"/>
       </p:ext>
     </p:extLst>
   </p:cSld>
@@ -14346,6 +14285,135 @@
             </a:pPr>
             <a:r>
               <a:rPr lang="en-US" dirty="0" smtClean="0"/>
+              <a:t>1. Minus signs:</a:t>
+            </a:r>
+          </a:p>
+          <a:p>
+            <a:pPr marL="457200" lvl="1" indent="0">
+              <a:buNone/>
+            </a:pPr>
+            <a:r>
+              <a:rPr lang="en-US" dirty="0" smtClean="0"/>
+              <a:t>They’re everywhere and come in pairs</a:t>
+            </a:r>
+          </a:p>
+          <a:p>
+            <a:pPr marL="457200" lvl="1" indent="0">
+              <a:buNone/>
+            </a:pPr>
+            <a:r>
+              <a:rPr lang="en-US" dirty="0" smtClean="0"/>
+              <a:t>Fixing one can make things look worse (when it’s more correct)</a:t>
+            </a:r>
+          </a:p>
+          <a:p>
+            <a:pPr marL="914400" lvl="2" indent="0">
+              <a:buNone/>
+            </a:pPr>
+            <a:r>
+              <a:rPr lang="en-US" dirty="0" smtClean="0"/>
+              <a:t>Contact point vs. penetration distance example</a:t>
+            </a:r>
+          </a:p>
+          <a:p>
+            <a:pPr marL="457200" lvl="1" indent="0">
+              <a:buNone/>
+            </a:pPr>
+            <a:r>
+              <a:rPr lang="en-US" dirty="0" smtClean="0"/>
+              <a:t>Intersection: consistent normal direction</a:t>
+            </a:r>
+          </a:p>
+          <a:p>
+            <a:pPr marL="457200" lvl="1" indent="0">
+              <a:buNone/>
+            </a:pPr>
+            <a:r>
+              <a:rPr lang="en-US" dirty="0"/>
+              <a:t>Can be more subtle (matrix multiplication order)</a:t>
+            </a:r>
+          </a:p>
+          <a:p>
+            <a:pPr lvl="1"/>
+            <a:endParaRPr lang="en-US" dirty="0" smtClean="0"/>
+          </a:p>
+        </p:txBody>
+      </p:sp>
+    </p:spTree>
+    <p:extLst>
+      <p:ext uri="{BB962C8B-B14F-4D97-AF65-F5344CB8AC3E}">
+        <p14:creationId xmlns:p14="http://schemas.microsoft.com/office/powerpoint/2010/main" val="3227015425"/>
+      </p:ext>
+    </p:extLst>
+  </p:cSld>
+  <p:clrMapOvr>
+    <a:masterClrMapping/>
+  </p:clrMapOvr>
+</p:sld>
+</file>
+
+<file path=ppt/slides/slide37.xml><?xml version="1.0" encoding="utf-8"?>
+<p:sld xmlns:a="http://schemas.openxmlformats.org/drawingml/2006/main" xmlns:r="http://schemas.openxmlformats.org/officeDocument/2006/relationships" xmlns:p="http://schemas.openxmlformats.org/presentationml/2006/main">
+  <p:cSld>
+    <p:spTree>
+      <p:nvGrpSpPr>
+        <p:cNvPr id="1" name=""/>
+        <p:cNvGrpSpPr/>
+        <p:nvPr/>
+      </p:nvGrpSpPr>
+      <p:grpSpPr>
+        <a:xfrm>
+          <a:off x="0" y="0"/>
+          <a:ext cx="0" cy="0"/>
+          <a:chOff x="0" y="0"/>
+          <a:chExt cx="0" cy="0"/>
+        </a:xfrm>
+      </p:grpSpPr>
+      <p:sp>
+        <p:nvSpPr>
+          <p:cNvPr id="2" name="Title 1"/>
+          <p:cNvSpPr>
+            <a:spLocks noGrp="1"/>
+          </p:cNvSpPr>
+          <p:nvPr>
+            <p:ph type="title"/>
+          </p:nvPr>
+        </p:nvSpPr>
+        <p:spPr/>
+        <p:txBody>
+          <a:bodyPr/>
+          <a:lstStyle/>
+          <a:p>
+            <a:r>
+              <a:rPr lang="en-US" dirty="0" smtClean="0"/>
+              <a:t>Common Pitfalls</a:t>
+            </a:r>
+            <a:endParaRPr lang="en-US" dirty="0"/>
+          </a:p>
+        </p:txBody>
+      </p:sp>
+      <p:sp>
+        <p:nvSpPr>
+          <p:cNvPr id="3" name="Content Placeholder 2"/>
+          <p:cNvSpPr>
+            <a:spLocks noGrp="1"/>
+          </p:cNvSpPr>
+          <p:nvPr>
+            <p:ph idx="1"/>
+          </p:nvPr>
+        </p:nvSpPr>
+        <p:spPr/>
+        <p:txBody>
+          <a:bodyPr>
+            <a:normAutofit/>
+          </a:bodyPr>
+          <a:lstStyle/>
+          <a:p>
+            <a:pPr marL="0" indent="0">
+              <a:buNone/>
+            </a:pPr>
+            <a:r>
+              <a:rPr lang="en-US" dirty="0" smtClean="0"/>
               <a:t>2. Space </a:t>
             </a:r>
             <a:r>
@@ -14416,7 +14484,7 @@
 </p:sld>
 </file>
 
-<file path=ppt/slides/slide37.xml><?xml version="1.0" encoding="utf-8"?>
+<file path=ppt/slides/slide38.xml><?xml version="1.0" encoding="utf-8"?>
 <p:sld xmlns:a="http://schemas.openxmlformats.org/drawingml/2006/main" xmlns:r="http://schemas.openxmlformats.org/officeDocument/2006/relationships" xmlns:p="http://schemas.openxmlformats.org/presentationml/2006/main">
   <p:cSld>
     <p:spTree>
@@ -14602,158 +14670,6 @@
 </p:sld>
 </file>
 
-<file path=ppt/slides/slide38.xml><?xml version="1.0" encoding="utf-8"?>
-<p:sld xmlns:a="http://schemas.openxmlformats.org/drawingml/2006/main" xmlns:r="http://schemas.openxmlformats.org/officeDocument/2006/relationships" xmlns:p="http://schemas.openxmlformats.org/presentationml/2006/main">
-  <p:cSld>
-    <p:spTree>
-      <p:nvGrpSpPr>
-        <p:cNvPr id="1" name=""/>
-        <p:cNvGrpSpPr/>
-        <p:nvPr/>
-      </p:nvGrpSpPr>
-      <p:grpSpPr>
-        <a:xfrm>
-          <a:off x="0" y="0"/>
-          <a:ext cx="0" cy="0"/>
-          <a:chOff x="0" y="0"/>
-          <a:chExt cx="0" cy="0"/>
-        </a:xfrm>
-      </p:grpSpPr>
-      <p:sp>
-        <p:nvSpPr>
-          <p:cNvPr id="2" name="Title 1"/>
-          <p:cNvSpPr>
-            <a:spLocks noGrp="1"/>
-          </p:cNvSpPr>
-          <p:nvPr>
-            <p:ph type="title"/>
-          </p:nvPr>
-        </p:nvSpPr>
-        <p:spPr/>
-        <p:txBody>
-          <a:bodyPr/>
-          <a:lstStyle/>
-          <a:p>
-            <a:r>
-              <a:rPr lang="en-US" dirty="0" smtClean="0"/>
-              <a:t>Common Pitfalls</a:t>
-            </a:r>
-            <a:endParaRPr lang="en-US" dirty="0"/>
-          </a:p>
-        </p:txBody>
-      </p:sp>
-      <p:sp>
-        <p:nvSpPr>
-          <p:cNvPr id="3" name="Content Placeholder 2"/>
-          <p:cNvSpPr>
-            <a:spLocks noGrp="1"/>
-          </p:cNvSpPr>
-          <p:nvPr>
-            <p:ph idx="1"/>
-          </p:nvPr>
-        </p:nvSpPr>
-        <p:spPr/>
-        <p:txBody>
-          <a:bodyPr>
-            <a:normAutofit/>
-          </a:bodyPr>
-          <a:lstStyle/>
-          <a:p>
-            <a:pPr marL="0" indent="0">
-              <a:buNone/>
-            </a:pPr>
-            <a:r>
-              <a:rPr lang="en-US" dirty="0" smtClean="0"/>
-              <a:t>4. Asking for help:</a:t>
-            </a:r>
-          </a:p>
-          <a:p>
-            <a:pPr marL="457200" lvl="1" indent="0">
-              <a:buNone/>
-            </a:pPr>
-            <a:r>
-              <a:rPr lang="en-US" dirty="0" smtClean="0"/>
-              <a:t>Ask peers!</a:t>
-            </a:r>
-          </a:p>
-          <a:p>
-            <a:pPr marL="457200" lvl="1" indent="0">
-              <a:buNone/>
-            </a:pPr>
-            <a:r>
-              <a:rPr lang="en-US" dirty="0" smtClean="0"/>
-              <a:t>Ask upper-classmen!</a:t>
-            </a:r>
-          </a:p>
-          <a:p>
-            <a:pPr marL="457200" lvl="1" indent="0">
-              <a:buNone/>
-            </a:pPr>
-            <a:r>
-              <a:rPr lang="en-US" dirty="0" smtClean="0"/>
-              <a:t>Ask teachers!</a:t>
-            </a:r>
-          </a:p>
-          <a:p>
-            <a:pPr marL="457200" lvl="1" indent="0">
-              <a:buNone/>
-            </a:pPr>
-            <a:r>
-              <a:rPr lang="en-US" dirty="0" smtClean="0"/>
-              <a:t>Ask me (seriously)!</a:t>
-            </a:r>
-          </a:p>
-          <a:p>
-            <a:pPr lvl="1"/>
-            <a:endParaRPr lang="en-US" dirty="0"/>
-          </a:p>
-          <a:p>
-            <a:pPr marL="0" indent="0">
-              <a:buNone/>
-            </a:pPr>
-            <a:r>
-              <a:rPr lang="en-US" dirty="0" smtClean="0"/>
-              <a:t>Ask for debugging help (try yourself first)</a:t>
-            </a:r>
-          </a:p>
-          <a:p>
-            <a:pPr marL="0" indent="0">
-              <a:buNone/>
-            </a:pPr>
-            <a:r>
-              <a:rPr lang="en-US" dirty="0" smtClean="0"/>
-              <a:t>Ask about architecture designs</a:t>
-            </a:r>
-          </a:p>
-          <a:p>
-            <a:pPr marL="0" indent="0">
-              <a:buNone/>
-            </a:pPr>
-            <a:r>
-              <a:rPr lang="en-US" dirty="0" smtClean="0"/>
-              <a:t>Ask about features / </a:t>
-            </a:r>
-            <a:r>
-              <a:rPr lang="en-US" dirty="0" err="1" smtClean="0"/>
-              <a:t>overscoping</a:t>
-            </a:r>
-            <a:endParaRPr lang="en-US" dirty="0" smtClean="0"/>
-          </a:p>
-        </p:txBody>
-      </p:sp>
-    </p:spTree>
-    <p:extLst>
-      <p:ext uri="{BB962C8B-B14F-4D97-AF65-F5344CB8AC3E}">
-        <p14:creationId xmlns:p14="http://schemas.microsoft.com/office/powerpoint/2010/main" val="1133246372"/>
-      </p:ext>
-    </p:extLst>
-  </p:cSld>
-  <p:clrMapOvr>
-    <a:masterClrMapping/>
-  </p:clrMapOvr>
-</p:sld>
-</file>
-
 <file path=ppt/slides/slide39.xml><?xml version="1.0" encoding="utf-8"?>
 <p:sld xmlns:a="http://schemas.openxmlformats.org/drawingml/2006/main" xmlns:r="http://schemas.openxmlformats.org/officeDocument/2006/relationships" xmlns:p="http://schemas.openxmlformats.org/presentationml/2006/main">
   <p:cSld>
@@ -14788,7 +14704,7 @@
           <a:p>
             <a:r>
               <a:rPr lang="en-US" dirty="0" smtClean="0"/>
-              <a:t>How to go from 2D to 3D</a:t>
+              <a:t>Common Pitfalls</a:t>
             </a:r>
             <a:endParaRPr lang="en-US" dirty="0"/>
           </a:p>
@@ -14816,8 +14732,48 @@
             </a:pPr>
             <a:r>
               <a:rPr lang="en-US" dirty="0" smtClean="0"/>
-              <a:t>All things linear are easy</a:t>
-            </a:r>
+              <a:t>4. Asking for help:</a:t>
+            </a:r>
+          </a:p>
+          <a:p>
+            <a:pPr marL="457200" lvl="1" indent="0">
+              <a:buNone/>
+            </a:pPr>
+            <a:r>
+              <a:rPr lang="en-US" dirty="0" smtClean="0"/>
+              <a:t>Ask peers!</a:t>
+            </a:r>
+          </a:p>
+          <a:p>
+            <a:pPr marL="457200" lvl="1" indent="0">
+              <a:buNone/>
+            </a:pPr>
+            <a:r>
+              <a:rPr lang="en-US" dirty="0" smtClean="0"/>
+              <a:t>Ask upper-classmen!</a:t>
+            </a:r>
+          </a:p>
+          <a:p>
+            <a:pPr marL="457200" lvl="1" indent="0">
+              <a:buNone/>
+            </a:pPr>
+            <a:r>
+              <a:rPr lang="en-US" dirty="0" smtClean="0"/>
+              <a:t>Ask teachers!</a:t>
+            </a:r>
+          </a:p>
+          <a:p>
+            <a:pPr marL="457200" lvl="1" indent="0">
+              <a:buNone/>
+            </a:pPr>
+            <a:r>
+              <a:rPr lang="en-US" dirty="0" smtClean="0"/>
+              <a:t>Ask me (seriously)!</a:t>
+            </a:r>
+          </a:p>
+          <a:p>
+            <a:pPr lvl="1"/>
+            <a:endParaRPr lang="en-US" dirty="0"/>
           </a:p>
           <a:p>
             <a:pPr marL="0" indent="0">
@@ -14825,63 +14781,17 @@
             </a:pPr>
             <a:r>
               <a:rPr lang="en-US" dirty="0" smtClean="0"/>
-              <a:t>All rotations are hard (float -&gt; Mat3):</a:t>
-            </a:r>
-          </a:p>
-          <a:p>
-            <a:pPr marL="457200" lvl="1" indent="0">
-              <a:buNone/>
-            </a:pPr>
-            <a:r>
-              <a:rPr lang="en-US" dirty="0" smtClean="0"/>
-              <a:t>Inertia -&gt; Inertia tensor (local vs. world)</a:t>
-            </a:r>
-          </a:p>
-          <a:p>
-            <a:pPr marL="457200" lvl="1" indent="0">
-              <a:buNone/>
-            </a:pPr>
-            <a:r>
-              <a:rPr lang="en-US" dirty="0"/>
-              <a:t>I</a:t>
-            </a:r>
-            <a:r>
-              <a:rPr lang="en-US" dirty="0" smtClean="0"/>
-              <a:t>ntegration (quaternions?)</a:t>
-            </a:r>
-          </a:p>
-          <a:p>
-            <a:pPr marL="457200" lvl="1" indent="0">
-              <a:buNone/>
-            </a:pPr>
-            <a:r>
-              <a:rPr lang="en-US" dirty="0" smtClean="0"/>
-              <a:t>Collision detection</a:t>
-            </a:r>
-          </a:p>
-          <a:p>
-            <a:pPr marL="914400" lvl="2" indent="0">
-              <a:buNone/>
-            </a:pPr>
-            <a:r>
-              <a:rPr lang="en-US" dirty="0" smtClean="0"/>
-              <a:t>Too many things to count</a:t>
-            </a:r>
-          </a:p>
-          <a:p>
-            <a:pPr marL="457200" lvl="1" indent="0">
-              <a:buNone/>
-            </a:pPr>
-            <a:r>
-              <a:rPr lang="en-US" dirty="0" smtClean="0"/>
-              <a:t>Stability</a:t>
+              <a:t>Ask for debugging help (try yourself first)</a:t>
             </a:r>
           </a:p>
           <a:p>
             <a:pPr marL="0" indent="0">
               <a:buNone/>
             </a:pPr>
-            <a:endParaRPr lang="en-US" dirty="0"/>
+            <a:r>
+              <a:rPr lang="en-US" dirty="0" smtClean="0"/>
+              <a:t>Ask about architecture designs</a:t>
+            </a:r>
           </a:p>
           <a:p>
             <a:pPr marL="0" indent="0">
@@ -14889,11 +14799,11 @@
             </a:pPr>
             <a:r>
               <a:rPr lang="en-US" dirty="0" smtClean="0"/>
-              <a:t>*Resolution doesn’t change too much</a:t>
-            </a:r>
-            <a:r>
-              <a:rPr lang="en-US" dirty="0"/>
-              <a:t>	</a:t>
+              <a:t>Ask about features / </a:t>
+            </a:r>
+            <a:r>
+              <a:rPr lang="en-US" dirty="0" err="1" smtClean="0"/>
+              <a:t>overscoping</a:t>
             </a:r>
             <a:endParaRPr lang="en-US" dirty="0" smtClean="0"/>
           </a:p>
@@ -14902,7 +14812,7 @@
     </p:spTree>
     <p:extLst>
       <p:ext uri="{BB962C8B-B14F-4D97-AF65-F5344CB8AC3E}">
-        <p14:creationId xmlns:p14="http://schemas.microsoft.com/office/powerpoint/2010/main" val="2039285384"/>
+        <p14:creationId xmlns:p14="http://schemas.microsoft.com/office/powerpoint/2010/main" val="1133246372"/>
       </p:ext>
     </p:extLst>
   </p:cSld>
@@ -15044,6 +14954,164 @@
           <a:p>
             <a:r>
               <a:rPr lang="en-US" dirty="0" smtClean="0"/>
+              <a:t>How to go from 2D to 3D</a:t>
+            </a:r>
+            <a:endParaRPr lang="en-US" dirty="0"/>
+          </a:p>
+        </p:txBody>
+      </p:sp>
+      <p:sp>
+        <p:nvSpPr>
+          <p:cNvPr id="3" name="Content Placeholder 2"/>
+          <p:cNvSpPr>
+            <a:spLocks noGrp="1"/>
+          </p:cNvSpPr>
+          <p:nvPr>
+            <p:ph idx="1"/>
+          </p:nvPr>
+        </p:nvSpPr>
+        <p:spPr/>
+        <p:txBody>
+          <a:bodyPr>
+            <a:normAutofit/>
+          </a:bodyPr>
+          <a:lstStyle/>
+          <a:p>
+            <a:pPr marL="0" indent="0">
+              <a:buNone/>
+            </a:pPr>
+            <a:r>
+              <a:rPr lang="en-US" dirty="0" smtClean="0"/>
+              <a:t>All things linear are easy</a:t>
+            </a:r>
+          </a:p>
+          <a:p>
+            <a:pPr marL="0" indent="0">
+              <a:buNone/>
+            </a:pPr>
+            <a:r>
+              <a:rPr lang="en-US" dirty="0" smtClean="0"/>
+              <a:t>All rotations are hard (float -&gt; Mat3):</a:t>
+            </a:r>
+          </a:p>
+          <a:p>
+            <a:pPr marL="457200" lvl="1" indent="0">
+              <a:buNone/>
+            </a:pPr>
+            <a:r>
+              <a:rPr lang="en-US" dirty="0" smtClean="0"/>
+              <a:t>Inertia -&gt; Inertia tensor (local vs. world)</a:t>
+            </a:r>
+          </a:p>
+          <a:p>
+            <a:pPr marL="457200" lvl="1" indent="0">
+              <a:buNone/>
+            </a:pPr>
+            <a:r>
+              <a:rPr lang="en-US" dirty="0"/>
+              <a:t>I</a:t>
+            </a:r>
+            <a:r>
+              <a:rPr lang="en-US" dirty="0" smtClean="0"/>
+              <a:t>ntegration (quaternions?)</a:t>
+            </a:r>
+          </a:p>
+          <a:p>
+            <a:pPr marL="457200" lvl="1" indent="0">
+              <a:buNone/>
+            </a:pPr>
+            <a:r>
+              <a:rPr lang="en-US" dirty="0" smtClean="0"/>
+              <a:t>Collision detection</a:t>
+            </a:r>
+          </a:p>
+          <a:p>
+            <a:pPr marL="914400" lvl="2" indent="0">
+              <a:buNone/>
+            </a:pPr>
+            <a:r>
+              <a:rPr lang="en-US" dirty="0" smtClean="0"/>
+              <a:t>Too many things to count</a:t>
+            </a:r>
+          </a:p>
+          <a:p>
+            <a:pPr marL="457200" lvl="1" indent="0">
+              <a:buNone/>
+            </a:pPr>
+            <a:r>
+              <a:rPr lang="en-US" dirty="0" smtClean="0"/>
+              <a:t>Stability</a:t>
+            </a:r>
+          </a:p>
+          <a:p>
+            <a:pPr marL="0" indent="0">
+              <a:buNone/>
+            </a:pPr>
+            <a:endParaRPr lang="en-US" dirty="0"/>
+          </a:p>
+          <a:p>
+            <a:pPr marL="0" indent="0">
+              <a:buNone/>
+            </a:pPr>
+            <a:r>
+              <a:rPr lang="en-US" dirty="0" smtClean="0"/>
+              <a:t>*Resolution doesn’t change too much</a:t>
+            </a:r>
+            <a:r>
+              <a:rPr lang="en-US" dirty="0"/>
+              <a:t>	</a:t>
+            </a:r>
+            <a:endParaRPr lang="en-US" dirty="0" smtClean="0"/>
+          </a:p>
+        </p:txBody>
+      </p:sp>
+    </p:spTree>
+    <p:extLst>
+      <p:ext uri="{BB962C8B-B14F-4D97-AF65-F5344CB8AC3E}">
+        <p14:creationId xmlns:p14="http://schemas.microsoft.com/office/powerpoint/2010/main" val="2039285384"/>
+      </p:ext>
+    </p:extLst>
+  </p:cSld>
+  <p:clrMapOvr>
+    <a:masterClrMapping/>
+  </p:clrMapOvr>
+</p:sld>
+</file>
+
+<file path=ppt/slides/slide41.xml><?xml version="1.0" encoding="utf-8"?>
+<p:sld xmlns:a="http://schemas.openxmlformats.org/drawingml/2006/main" xmlns:r="http://schemas.openxmlformats.org/officeDocument/2006/relationships" xmlns:p="http://schemas.openxmlformats.org/presentationml/2006/main">
+  <p:cSld>
+    <p:spTree>
+      <p:nvGrpSpPr>
+        <p:cNvPr id="1" name=""/>
+        <p:cNvGrpSpPr/>
+        <p:nvPr/>
+      </p:nvGrpSpPr>
+      <p:grpSpPr>
+        <a:xfrm>
+          <a:off x="0" y="0"/>
+          <a:ext cx="0" cy="0"/>
+          <a:chOff x="0" y="0"/>
+          <a:chExt cx="0" cy="0"/>
+        </a:xfrm>
+      </p:grpSpPr>
+      <p:sp>
+        <p:nvSpPr>
+          <p:cNvPr id="2" name="Title 1"/>
+          <p:cNvSpPr>
+            <a:spLocks noGrp="1"/>
+          </p:cNvSpPr>
+          <p:nvPr>
+            <p:ph type="title"/>
+          </p:nvPr>
+        </p:nvSpPr>
+        <p:spPr/>
+        <p:txBody>
+          <a:bodyPr/>
+          <a:lstStyle/>
+          <a:p>
+            <a:r>
+              <a:rPr lang="en-US" dirty="0" smtClean="0"/>
               <a:t>Questions?</a:t>
             </a:r>
             <a:endParaRPr lang="en-US" dirty="0"/>
@@ -15098,7 +15166,7 @@
 </p:sld>
 </file>
 
-<file path=ppt/slides/slide41.xml><?xml version="1.0" encoding="utf-8"?>
+<file path=ppt/slides/slide42.xml><?xml version="1.0" encoding="utf-8"?>
 <p:sld xmlns:a="http://schemas.openxmlformats.org/drawingml/2006/main" xmlns:r="http://schemas.openxmlformats.org/officeDocument/2006/relationships" xmlns:p="http://schemas.openxmlformats.org/presentationml/2006/main">
   <p:cSld>
     <p:spTree>

</xml_diff>